<commit_message>
Added learning objectives to README.
</commit_message>
<xml_diff>
--- a/presentations/01_transformers_intro.pptx
+++ b/presentations/01_transformers_intro.pptx
@@ -226,7 +226,7 @@
           <a:p>
             <a:fld id="{FD93C9B2-20F6-4DB1-B471-224337D0AC79}" type="datetimeFigureOut">
               <a:rPr lang="en-US" smtClean="0"/>
-              <a:t>3/23/2022</a:t>
+              <a:t>3/30/2022</a:t>
             </a:fld>
             <a:endParaRPr lang="en-US"/>
           </a:p>
@@ -1459,7 +1459,7 @@
             <a:pPr algn="l"/>
             <a:r>
               <a:rPr lang="en-US" dirty="0"/>
-              <a:t>One way to proceed would be to invite your subject back to the studio and paint a whole new portrait from scratch on a blank canvas, only this time with the new ring on their finger. That would require a lot of time and effort. If they’d allow it, a more expeditious approach would be to take the portrait you have, and unobtrusively paint the new ring over the old one.</a:t>
+              <a:t>One way to proceed would be to invite your subject back to the studio and paint a whole new portrait from scratch on a blank canvas, only this time with the new ring on their finger. That would require a lot of time and effort.  A faster way would be to take the portrait you have, and just paint the new ring over the old one.</a:t>
             </a:r>
           </a:p>
           <a:p>
@@ -1481,7 +1481,7 @@
             <a:pPr algn="l"/>
             <a:r>
               <a:rPr lang="en-US" dirty="0"/>
-              <a:t>The extra line in the drawing (red) that carries the input to the addition node is called a </a:t>
+              <a:t>The red line in the drawing which carries the input directly to the addition node is called a </a:t>
             </a:r>
             <a:r>
               <a:rPr lang="en-US" b="1" dirty="0"/>
@@ -1489,7 +1489,7 @@
             </a:r>
             <a:r>
               <a:rPr lang="en-US" dirty="0"/>
-              <a:t>, or a residual connection because of its mathematical interpretation.  We can place a skip connection around multiple layers in sequence, if we like, as shown here on the right.</a:t>
+              <a:t>, or a residual connection.  We can also place a skip connection around multiple layers in sequence, if we like, as shown here on the right.</a:t>
             </a:r>
           </a:p>
         </p:txBody>
@@ -1581,7 +1581,7 @@
             </a:r>
             <a:r>
               <a:rPr lang="en-US" dirty="0"/>
-              <a:t>is our third building block.  In transformers, we usually apply a regularization step called layer normalization, or layer norm, to the outputs of a layer, as shown here on the left. Layer norm belongs to the class of regularization techniques, such as dropout and batchnorm, which help control overfitting by keeping the values flowing through the network from getting too big or too small. The layer norm step learns to adjust the values coming out of a layer so that they approximate the shape of a Gaussian bump with a mean of 0 and standard deviation of 1.</a:t>
+              <a:t>is our third building block.  In transformers, we usually apply a regularization step called layer normalization, or layer norm, to the outputs of a layer, as shown here on the left. Layer norm belongs to the class of regularization techniques, such as dropout and batchnorm, which help control overfitting by keeping the values flowing through the network from getting too big or too small. (Vanishing / exploding gradients)  The layer norm step learns to adjust the values coming out of a layer so that they approximate the shape of a Gaussian bump with a mean of 0 and standard deviation of 1.</a:t>
             </a:r>
           </a:p>
         </p:txBody>
@@ -1677,7 +1677,7 @@
             </a:r>
             <a:r>
               <a:rPr lang="en-US" dirty="0"/>
-              <a:t>– was designed to solve a problem that comes up as soon as we take RNNs out of our system: we lose track of where each word is located in the input sentence. This important information is inherent in the RNN structure, because the words come in one at a time, allowing the hidden state inside a recurrent cell to remember the order in which the words arrived.</a:t>
+              <a:t>– was designed to solve a problem that comes up as soon as we take RNNs out of our system: we lose track of where each word is in the input sentence. This important information is inherent in the RNN structure, because the words come in one at a time, allowing the hidden state inside a recurrent cell to remember the order in which the words arrived.</a:t>
             </a:r>
           </a:p>
           <a:p>
@@ -1699,7 +1699,7 @@
             <a:pPr algn="l"/>
             <a:r>
               <a:rPr lang="en-US" dirty="0"/>
-              <a:t>The answer is to insert each word’s position, or index, into the representation for the word itself. That way, as the word’s representations get processed, the position information naturally comes along for the ride. The generic name for this process is positional encoding.</a:t>
+              <a:t>The answer is to insert each word’s position, or index, into the representation for the word itself. That way, as the word’s representations get processed, the position information naturally comes along for the ride. The generic name for this process is positional encoding.  I will not cover the technical details of positional encoding in this mini-lecture.</a:t>
             </a:r>
           </a:p>
           <a:p>
@@ -1710,18 +1710,7 @@
             <a:pPr algn="l"/>
             <a:r>
               <a:rPr lang="en-US" dirty="0"/>
-              <a:t>A simple approach to positional encoding is to append a few bits to the end of each word to hold its location, as shown on the left. But at some point, we might get a sentence that requires more bits than we’ve made available, and then we’d be in trouble because we wouldn’t be able to assign each word a unique number for its location. And if we make the storage too big, it’s just wasted and slows everything down. This approach is also awkward to implement, since we then need to introduce some special mechanism for handling those bits.</a:t>
-            </a:r>
-          </a:p>
-          <a:p>
-            <a:pPr algn="l"/>
-            <a:endParaRPr lang="en-US" dirty="0"/>
-          </a:p>
-          <a:p>
-            <a:pPr algn="l"/>
-            <a:r>
-              <a:rPr lang="en-US" dirty="0"/>
-              <a:t>Alright, that wraps up our presentation of transformer building blocks.  It’s time for some hands-on work.</a:t>
+              <a:t>Alright, that wraps up this mini-lecture of transformer building blocks.  </a:t>
             </a:r>
           </a:p>
         </p:txBody>
@@ -3136,7 +3125,7 @@
           <a:p>
             <a:fld id="{C3F78080-8D0A-4BE8-A5B4-CB115102D524}" type="datetimeFigureOut">
               <a:rPr lang="en-US" smtClean="0"/>
-              <a:t>3/23/2022</a:t>
+              <a:t>3/30/2022</a:t>
             </a:fld>
             <a:endParaRPr lang="en-US"/>
           </a:p>
@@ -3334,7 +3323,7 @@
           <a:p>
             <a:fld id="{C3F78080-8D0A-4BE8-A5B4-CB115102D524}" type="datetimeFigureOut">
               <a:rPr lang="en-US" smtClean="0"/>
-              <a:t>3/23/2022</a:t>
+              <a:t>3/30/2022</a:t>
             </a:fld>
             <a:endParaRPr lang="en-US"/>
           </a:p>
@@ -3542,7 +3531,7 @@
           <a:p>
             <a:fld id="{C3F78080-8D0A-4BE8-A5B4-CB115102D524}" type="datetimeFigureOut">
               <a:rPr lang="en-US" smtClean="0"/>
-              <a:t>3/23/2022</a:t>
+              <a:t>3/30/2022</a:t>
             </a:fld>
             <a:endParaRPr lang="en-US"/>
           </a:p>
@@ -3740,7 +3729,7 @@
           <a:p>
             <a:fld id="{C3F78080-8D0A-4BE8-A5B4-CB115102D524}" type="datetimeFigureOut">
               <a:rPr lang="en-US" smtClean="0"/>
-              <a:t>3/23/2022</a:t>
+              <a:t>3/30/2022</a:t>
             </a:fld>
             <a:endParaRPr lang="en-US"/>
           </a:p>
@@ -4015,7 +4004,7 @@
           <a:p>
             <a:fld id="{C3F78080-8D0A-4BE8-A5B4-CB115102D524}" type="datetimeFigureOut">
               <a:rPr lang="en-US" smtClean="0"/>
-              <a:t>3/23/2022</a:t>
+              <a:t>3/30/2022</a:t>
             </a:fld>
             <a:endParaRPr lang="en-US"/>
           </a:p>
@@ -4280,7 +4269,7 @@
           <a:p>
             <a:fld id="{C3F78080-8D0A-4BE8-A5B4-CB115102D524}" type="datetimeFigureOut">
               <a:rPr lang="en-US" smtClean="0"/>
-              <a:t>3/23/2022</a:t>
+              <a:t>3/30/2022</a:t>
             </a:fld>
             <a:endParaRPr lang="en-US"/>
           </a:p>
@@ -4692,7 +4681,7 @@
           <a:p>
             <a:fld id="{C3F78080-8D0A-4BE8-A5B4-CB115102D524}" type="datetimeFigureOut">
               <a:rPr lang="en-US" smtClean="0"/>
-              <a:t>3/23/2022</a:t>
+              <a:t>3/30/2022</a:t>
             </a:fld>
             <a:endParaRPr lang="en-US"/>
           </a:p>
@@ -4833,7 +4822,7 @@
           <a:p>
             <a:fld id="{C3F78080-8D0A-4BE8-A5B4-CB115102D524}" type="datetimeFigureOut">
               <a:rPr lang="en-US" smtClean="0"/>
-              <a:t>3/23/2022</a:t>
+              <a:t>3/30/2022</a:t>
             </a:fld>
             <a:endParaRPr lang="en-US"/>
           </a:p>
@@ -4946,7 +4935,7 @@
           <a:p>
             <a:fld id="{C3F78080-8D0A-4BE8-A5B4-CB115102D524}" type="datetimeFigureOut">
               <a:rPr lang="en-US" smtClean="0"/>
-              <a:t>3/23/2022</a:t>
+              <a:t>3/30/2022</a:t>
             </a:fld>
             <a:endParaRPr lang="en-US"/>
           </a:p>
@@ -5257,7 +5246,7 @@
           <a:p>
             <a:fld id="{C3F78080-8D0A-4BE8-A5B4-CB115102D524}" type="datetimeFigureOut">
               <a:rPr lang="en-US" smtClean="0"/>
-              <a:t>3/23/2022</a:t>
+              <a:t>3/30/2022</a:t>
             </a:fld>
             <a:endParaRPr lang="en-US"/>
           </a:p>
@@ -5545,7 +5534,7 @@
           <a:p>
             <a:fld id="{C3F78080-8D0A-4BE8-A5B4-CB115102D524}" type="datetimeFigureOut">
               <a:rPr lang="en-US" smtClean="0"/>
-              <a:t>3/23/2022</a:t>
+              <a:t>3/30/2022</a:t>
             </a:fld>
             <a:endParaRPr lang="en-US"/>
           </a:p>
@@ -5786,7 +5775,7 @@
           <a:p>
             <a:fld id="{C3F78080-8D0A-4BE8-A5B4-CB115102D524}" type="datetimeFigureOut">
               <a:rPr lang="en-US" smtClean="0"/>
-              <a:t>3/23/2022</a:t>
+              <a:t>3/30/2022</a:t>
             </a:fld>
             <a:endParaRPr lang="en-US"/>
           </a:p>

</xml_diff>

<commit_message>
Added attention content to presentations.
</commit_message>
<xml_diff>
--- a/presentations/01_transformers_intro.pptx
+++ b/presentations/01_transformers_intro.pptx
@@ -5,7 +5,7 @@
     <p:sldMasterId id="2147483648" r:id="rId1"/>
   </p:sldMasterIdLst>
   <p:notesMasterIdLst>
-    <p:notesMasterId r:id="rId19"/>
+    <p:notesMasterId r:id="rId20"/>
   </p:notesMasterIdLst>
   <p:sldIdLst>
     <p:sldId id="326" r:id="rId2"/>
@@ -14,17 +14,18 @@
     <p:sldId id="346" r:id="rId5"/>
     <p:sldId id="347" r:id="rId6"/>
     <p:sldId id="333" r:id="rId7"/>
-    <p:sldId id="279" r:id="rId8"/>
-    <p:sldId id="336" r:id="rId9"/>
-    <p:sldId id="330" r:id="rId10"/>
-    <p:sldId id="327" r:id="rId11"/>
-    <p:sldId id="329" r:id="rId12"/>
-    <p:sldId id="334" r:id="rId13"/>
-    <p:sldId id="343" r:id="rId14"/>
-    <p:sldId id="344" r:id="rId15"/>
-    <p:sldId id="341" r:id="rId16"/>
-    <p:sldId id="331" r:id="rId17"/>
-    <p:sldId id="332" r:id="rId18"/>
+    <p:sldId id="348" r:id="rId8"/>
+    <p:sldId id="279" r:id="rId9"/>
+    <p:sldId id="336" r:id="rId10"/>
+    <p:sldId id="330" r:id="rId11"/>
+    <p:sldId id="327" r:id="rId12"/>
+    <p:sldId id="329" r:id="rId13"/>
+    <p:sldId id="334" r:id="rId14"/>
+    <p:sldId id="343" r:id="rId15"/>
+    <p:sldId id="344" r:id="rId16"/>
+    <p:sldId id="341" r:id="rId17"/>
+    <p:sldId id="331" r:id="rId18"/>
+    <p:sldId id="332" r:id="rId19"/>
   </p:sldIdLst>
   <p:sldSz cx="12192000" cy="6858000"/>
   <p:notesSz cx="6858000" cy="9144000"/>
@@ -224,7 +225,7 @@
           <a:p>
             <a:fld id="{FD93C9B2-20F6-4DB1-B471-224337D0AC79}" type="datetimeFigureOut">
               <a:rPr lang="en-US" smtClean="0"/>
-              <a:t>7/6/2022</a:t>
+              <a:t>7/8/2022</a:t>
             </a:fld>
             <a:endParaRPr lang="en-US"/>
           </a:p>
@@ -648,44 +649,11 @@
             <a:pPr algn="l"/>
             <a:r>
               <a:rPr lang="en-US" b="1" dirty="0"/>
-              <a:t>Positional encoding </a:t>
+              <a:t>Layer norm </a:t>
             </a:r>
             <a:r>
               <a:rPr lang="en-US" dirty="0"/>
-              <a:t>– was designed to solve a problem that comes up as soon as we take RNNs out of our system: we lose track of where each word is in the input sentence. This important information is inherent in the RNN structure, because the words come in one at a time, allowing the hidden state inside a recurrent cell to remember the order in which the words arrived.</a:t>
-            </a:r>
-          </a:p>
-          <a:p>
-            <a:pPr algn="l"/>
-            <a:endParaRPr lang="en-US" dirty="0"/>
-          </a:p>
-          <a:p>
-            <a:pPr algn="l"/>
-            <a:r>
-              <a:rPr lang="en-US" dirty="0"/>
-              <a:t>But as we’ve seen, attention mixes together the representations of multiple words. How can later stages know where each word belongs in the sentence?</a:t>
-            </a:r>
-          </a:p>
-          <a:p>
-            <a:pPr algn="l"/>
-            <a:endParaRPr lang="en-US" dirty="0"/>
-          </a:p>
-          <a:p>
-            <a:pPr algn="l"/>
-            <a:r>
-              <a:rPr lang="en-US" dirty="0"/>
-              <a:t>The answer is to insert each word’s position, or index, into the representation for the word itself. That way, as the word’s representations get processed, the position information naturally comes along for the ride. The generic name for this process is positional encoding.  I will not cover the technical details of positional encoding in this mini-lecture.</a:t>
-            </a:r>
-          </a:p>
-          <a:p>
-            <a:pPr algn="l"/>
-            <a:endParaRPr lang="en-US" dirty="0"/>
-          </a:p>
-          <a:p>
-            <a:pPr algn="l"/>
-            <a:r>
-              <a:rPr lang="en-US" dirty="0"/>
-              <a:t>Alright, that wraps up this mini-lecture of transformer building blocks.  </a:t>
+              <a:t>is our first building block.  In transformers, we usually apply a regularization step called layer normalization, or layer norm, to the outputs of a layer, as shown here on the left. Layer norm belongs to the class of regularization techniques, such as dropout and batchnorm, which help control overfitting by keeping the values flowing through the network from getting too big or too small. (Vanishing / exploding gradients)  The layer norm step learns to adjust the values coming out of a layer so that they approximate the shape of a Gaussian bump with a mean of 0 and standard deviation of 1.</a:t>
             </a:r>
           </a:p>
         </p:txBody>
@@ -716,7 +684,7 @@
     </p:spTree>
     <p:extLst>
       <p:ext uri="{BB962C8B-B14F-4D97-AF65-F5344CB8AC3E}">
-        <p14:creationId xmlns:p14="http://schemas.microsoft.com/office/powerpoint/2010/main" val="50257330"/>
+        <p14:creationId xmlns:p14="http://schemas.microsoft.com/office/powerpoint/2010/main" val="3456021193"/>
       </p:ext>
     </p:extLst>
   </p:cSld>
@@ -772,16 +740,12 @@
           <a:p>
             <a:pPr algn="l"/>
             <a:r>
+              <a:rPr lang="en-US" b="1" dirty="0"/>
+              <a:t>Positional encoding </a:t>
+            </a:r>
+            <a:r>
               <a:rPr lang="en-US" dirty="0"/>
-              <a:t>And finally, our third transformer building block is the </a:t>
-            </a:r>
-            <a:r>
-              <a:rPr lang="en-US" b="1" dirty="0"/>
-              <a:t>skip connection</a:t>
-            </a:r>
-            <a:r>
-              <a:rPr lang="en-US" dirty="0"/>
-              <a:t>, also known as a residual connection. The inspiration for this innovation lies in our desire to reduce the amount of work that’s required of a deep network layer.</a:t>
+              <a:t>– was designed to solve a problem that comes up as soon as we take RNNs out of our system: we lose track of where each word is in the input sentence. This important information is inherent in the RNN structure, because the words come in one at a time, allowing the hidden state inside a recurrent cell to remember the order in which the words arrived.</a:t>
             </a:r>
           </a:p>
           <a:p>
@@ -792,7 +756,7 @@
             <a:pPr algn="l"/>
             <a:r>
               <a:rPr lang="en-US" dirty="0"/>
-              <a:t>Let’s start with an analogy. Suppose you’re painting a real, physical portrait using acrylic paints on canvas. After weeks of sittings, the portrait is done, and you send it to your subject for their approval. They say that they like it, but they regret having worn a particular ring on one finger, and wish they’d worn a different one that they like more. Can you change that?</a:t>
+              <a:t>But as we’ve seen, attention mixes together the representations of multiple words. How can later stages know where each word belongs in the sentence?</a:t>
             </a:r>
           </a:p>
           <a:p>
@@ -803,7 +767,7 @@
             <a:pPr algn="l"/>
             <a:r>
               <a:rPr lang="en-US" dirty="0"/>
-              <a:t>One way to proceed would be to invite your subject back to the studio and paint a whole new portrait from scratch on a blank canvas, only this time with the new ring on their finger. That would require a lot of time and effort.  A faster way would be to take the portrait you have, and just paint the new ring over the old one.</a:t>
+              <a:t>The answer is to insert each word’s position, or index, into the representation for the word itself. That way, as the word’s representations get processed, the position information naturally comes along for the ride. The generic name for this process is positional encoding.  I will not cover the technical details of positional encoding in this mini-lecture.</a:t>
             </a:r>
           </a:p>
           <a:p>
@@ -814,26 +778,7 @@
             <a:pPr algn="l"/>
             <a:r>
               <a:rPr lang="en-US" dirty="0"/>
-              <a:t>Now consider a layer in a deep network. A tensor comes in, and the layer does some processing to change that tensor. If the layer only needs to change the input by small amounts, or only in some places, then it would be wasteful to expend resources processing the parts of the tensor that don’t need to change. Just as with the painting, it would be much more efficient for the layer to compute only the changes it wants to make. Then it can combine those changes with the original input to produce its output.</a:t>
-            </a:r>
-          </a:p>
-          <a:p>
-            <a:pPr algn="l"/>
-            <a:endParaRPr lang="en-US" dirty="0"/>
-          </a:p>
-          <a:p>
-            <a:pPr algn="l"/>
-            <a:r>
-              <a:rPr lang="en-US" dirty="0"/>
-              <a:t>The red line in the drawing which carries the input directly to the addition node is called a </a:t>
-            </a:r>
-            <a:r>
-              <a:rPr lang="en-US" b="1" dirty="0"/>
-              <a:t>skip connection</a:t>
-            </a:r>
-            <a:r>
-              <a:rPr lang="en-US" dirty="0"/>
-              <a:t>, or a residual connection.  We can also place a skip connection around multiple layers in sequence, if we like, as shown here on the right.</a:t>
+              <a:t>Alright, that wraps up this mini-lecture of transformer building blocks.  </a:t>
             </a:r>
           </a:p>
         </p:txBody>
@@ -864,7 +809,7 @@
     </p:spTree>
     <p:extLst>
       <p:ext uri="{BB962C8B-B14F-4D97-AF65-F5344CB8AC3E}">
-        <p14:creationId xmlns:p14="http://schemas.microsoft.com/office/powerpoint/2010/main" val="3507246277"/>
+        <p14:creationId xmlns:p14="http://schemas.microsoft.com/office/powerpoint/2010/main" val="50257330"/>
       </p:ext>
     </p:extLst>
   </p:cSld>
@@ -920,25 +865,69 @@
           <a:p>
             <a:pPr algn="l"/>
             <a:r>
-              <a:rPr lang="en-US" b="0" i="0" dirty="0">
-                <a:solidFill>
-                  <a:srgbClr val="292929"/>
-                </a:solidFill>
-                <a:effectLst/>
-                <a:latin typeface="+mn-lt"/>
-              </a:rPr>
-              <a:t>An encoder may feature multiple transformer building blocks.  Here we see an encoder comprised of a self-attention layer as well as a couple of layer norm layers.  Additionally, residual skip connections allow this encoder to bypass the self-attention and feed forward layers as needed.  We will discuss these unique transformer building blocks in just a moment…</a:t>
+              <a:rPr lang="en-US" dirty="0"/>
+              <a:t>And finally, our third transformer building block is the </a:t>
+            </a:r>
+            <a:r>
+              <a:rPr lang="en-US" b="1" dirty="0"/>
+              <a:t>skip connection</a:t>
+            </a:r>
+            <a:r>
+              <a:rPr lang="en-US" dirty="0"/>
+              <a:t>, also known as a residual connection. The inspiration for this innovation lies in our desire to reduce the amount of work that’s required of a deep network layer.</a:t>
             </a:r>
           </a:p>
           <a:p>
             <a:pPr algn="l"/>
-            <a:endParaRPr lang="en-US" b="0" i="0" dirty="0">
-              <a:solidFill>
-                <a:srgbClr val="292929"/>
-              </a:solidFill>
-              <a:effectLst/>
-              <a:latin typeface="+mn-lt"/>
-            </a:endParaRPr>
+            <a:endParaRPr lang="en-US" dirty="0"/>
+          </a:p>
+          <a:p>
+            <a:pPr algn="l"/>
+            <a:r>
+              <a:rPr lang="en-US" dirty="0"/>
+              <a:t>Let’s start with an analogy. Suppose you’re painting a real, physical portrait using acrylic paints on canvas. After weeks of sittings, the portrait is done, and you send it to your subject for their approval. They say that they like it, but they regret having worn a particular ring on one finger, and wish they’d worn a different one that they like more. Can you change that?</a:t>
+            </a:r>
+          </a:p>
+          <a:p>
+            <a:pPr algn="l"/>
+            <a:endParaRPr lang="en-US" dirty="0"/>
+          </a:p>
+          <a:p>
+            <a:pPr algn="l"/>
+            <a:r>
+              <a:rPr lang="en-US" dirty="0"/>
+              <a:t>One way to proceed would be to invite your subject back to the studio and paint a whole new portrait from scratch on a blank canvas, only this time with the new ring on their finger. That would require a lot of time and effort.  A faster way would be to take the portrait you have, and just paint the new ring over the old one.</a:t>
+            </a:r>
+          </a:p>
+          <a:p>
+            <a:pPr algn="l"/>
+            <a:endParaRPr lang="en-US" dirty="0"/>
+          </a:p>
+          <a:p>
+            <a:pPr algn="l"/>
+            <a:r>
+              <a:rPr lang="en-US" dirty="0"/>
+              <a:t>Now consider a layer in a deep network. A tensor comes in, and the layer does some processing to change that tensor. If the layer only needs to change the input by small amounts, or only in some places, then it would be wasteful to expend resources processing the parts of the tensor that don’t need to change. Just as with the painting, it would be much more efficient for the layer to compute only the changes it wants to make. Then it can combine those changes with the original input to produce its output.</a:t>
+            </a:r>
+          </a:p>
+          <a:p>
+            <a:pPr algn="l"/>
+            <a:endParaRPr lang="en-US" dirty="0"/>
+          </a:p>
+          <a:p>
+            <a:pPr algn="l"/>
+            <a:r>
+              <a:rPr lang="en-US" dirty="0"/>
+              <a:t>The red line in the drawing which carries the input directly to the addition node is called a </a:t>
+            </a:r>
+            <a:r>
+              <a:rPr lang="en-US" b="1" dirty="0"/>
+              <a:t>skip connection</a:t>
+            </a:r>
+            <a:r>
+              <a:rPr lang="en-US" dirty="0"/>
+              <a:t>, or a residual connection.  We can also place a skip connection around multiple layers in sequence, if we like, as shown here on the right.</a:t>
+            </a:r>
           </a:p>
         </p:txBody>
       </p:sp>
@@ -968,7 +957,7 @@
     </p:spTree>
     <p:extLst>
       <p:ext uri="{BB962C8B-B14F-4D97-AF65-F5344CB8AC3E}">
-        <p14:creationId xmlns:p14="http://schemas.microsoft.com/office/powerpoint/2010/main" val="3560973607"/>
+        <p14:creationId xmlns:p14="http://schemas.microsoft.com/office/powerpoint/2010/main" val="3507246277"/>
       </p:ext>
     </p:extLst>
   </p:cSld>
@@ -1022,24 +1011,27 @@
           <a:bodyPr/>
           <a:lstStyle/>
           <a:p>
-            <a:pPr marL="0" marR="0" lvl="0" indent="0" algn="l" defTabSz="914400" rtl="0" eaLnBrk="1" fontAlgn="auto" latinLnBrk="0" hangingPunct="1">
-              <a:lnSpc>
-                <a:spcPct val="100000"/>
-              </a:lnSpc>
-              <a:spcBef>
-                <a:spcPts val="0"/>
-              </a:spcBef>
-              <a:spcAft>
-                <a:spcPts val="0"/>
-              </a:spcAft>
-              <a:buClrTx/>
-              <a:buSzTx/>
-              <a:buFontTx/>
-              <a:buNone/>
-              <a:tabLst/>
-              <a:defRPr/>
-            </a:pPr>
-            <a:endParaRPr lang="en-US" dirty="0"/>
+            <a:pPr algn="l"/>
+            <a:r>
+              <a:rPr lang="en-US" b="0" i="0" dirty="0">
+                <a:solidFill>
+                  <a:srgbClr val="292929"/>
+                </a:solidFill>
+                <a:effectLst/>
+                <a:latin typeface="+mn-lt"/>
+              </a:rPr>
+              <a:t>An encoder may feature multiple transformer building blocks.  Here we see an encoder comprised of a self-attention layer as well as a couple of layer norm layers.  Additionally, residual skip connections allow this encoder to bypass the self-attention and feed forward layers as needed.  We will discuss these unique transformer building blocks in just a moment…</a:t>
+            </a:r>
+          </a:p>
+          <a:p>
+            <a:pPr algn="l"/>
+            <a:endParaRPr lang="en-US" b="0" i="0" dirty="0">
+              <a:solidFill>
+                <a:srgbClr val="292929"/>
+              </a:solidFill>
+              <a:effectLst/>
+              <a:latin typeface="+mn-lt"/>
+            </a:endParaRPr>
           </a:p>
         </p:txBody>
       </p:sp>
@@ -1069,7 +1061,7 @@
     </p:spTree>
     <p:extLst>
       <p:ext uri="{BB962C8B-B14F-4D97-AF65-F5344CB8AC3E}">
-        <p14:creationId xmlns:p14="http://schemas.microsoft.com/office/powerpoint/2010/main" val="393175974"/>
+        <p14:creationId xmlns:p14="http://schemas.microsoft.com/office/powerpoint/2010/main" val="3560973607"/>
       </p:ext>
     </p:extLst>
   </p:cSld>
@@ -1170,7 +1162,7 @@
     </p:spTree>
     <p:extLst>
       <p:ext uri="{BB962C8B-B14F-4D97-AF65-F5344CB8AC3E}">
-        <p14:creationId xmlns:p14="http://schemas.microsoft.com/office/powerpoint/2010/main" val="4095264016"/>
+        <p14:creationId xmlns:p14="http://schemas.microsoft.com/office/powerpoint/2010/main" val="393175974"/>
       </p:ext>
     </p:extLst>
   </p:cSld>
@@ -1271,7 +1263,7 @@
     </p:spTree>
     <p:extLst>
       <p:ext uri="{BB962C8B-B14F-4D97-AF65-F5344CB8AC3E}">
-        <p14:creationId xmlns:p14="http://schemas.microsoft.com/office/powerpoint/2010/main" val="3333302820"/>
+        <p14:creationId xmlns:p14="http://schemas.microsoft.com/office/powerpoint/2010/main" val="4095264016"/>
       </p:ext>
     </p:extLst>
   </p:cSld>
@@ -1325,63 +1317,24 @@
           <a:bodyPr/>
           <a:lstStyle/>
           <a:p>
-            <a:pPr algn="l"/>
-            <a:r>
-              <a:rPr lang="en-US" b="0" i="0" dirty="0">
-                <a:solidFill>
-                  <a:srgbClr val="292929"/>
-                </a:solidFill>
-                <a:effectLst/>
-                <a:latin typeface="+mn-lt"/>
-              </a:rPr>
-              <a:t>We begin with a simple image…  first off, the Transformer architecture excels at handling text data which is inherently sequential.  It takes a text sequence as input and produces another text sequence as output;  for example, to translate an input English sentence to Spanish.</a:t>
-            </a:r>
-          </a:p>
-          <a:p>
-            <a:pPr algn="l"/>
-            <a:endParaRPr lang="en-US" b="0" i="0" dirty="0">
-              <a:solidFill>
-                <a:srgbClr val="292929"/>
-              </a:solidFill>
-              <a:effectLst/>
-              <a:latin typeface="+mn-lt"/>
-            </a:endParaRPr>
-          </a:p>
-          <a:p>
-            <a:pPr algn="l"/>
-            <a:r>
-              <a:rPr lang="en-US" b="0" i="0" dirty="0">
-                <a:solidFill>
-                  <a:srgbClr val="292929"/>
-                </a:solidFill>
-                <a:effectLst/>
-                <a:latin typeface="charter"/>
-              </a:rPr>
-              <a:t>As opposed to directional models, which read the text input sequentially (left-to-right or right-to-left), the Transformer encoder reads the entire sequence of words at once. Therefore, it is considered bidirectional, though it would be more accurate to say that it’s non-directional. This characteristic allows the model to learn the context of a word based on </a:t>
-            </a:r>
-            <a:r>
-              <a:rPr lang="en-US" b="1" i="0" dirty="0">
-                <a:solidFill>
-                  <a:srgbClr val="292929"/>
-                </a:solidFill>
-                <a:effectLst/>
-                <a:latin typeface="charter"/>
-              </a:rPr>
-              <a:t>all</a:t>
-            </a:r>
-            <a:r>
-              <a:rPr lang="en-US" b="0" i="0" dirty="0">
-                <a:solidFill>
-                  <a:srgbClr val="292929"/>
-                </a:solidFill>
-                <a:effectLst/>
-                <a:latin typeface="charter"/>
-              </a:rPr>
-              <a:t> of its surroundings (left and right of the word).</a:t>
-            </a:r>
-            <a:endParaRPr lang="en-US" dirty="0">
-              <a:latin typeface="+mn-lt"/>
-            </a:endParaRPr>
+            <a:pPr marL="0" marR="0" lvl="0" indent="0" algn="l" defTabSz="914400" rtl="0" eaLnBrk="1" fontAlgn="auto" latinLnBrk="0" hangingPunct="1">
+              <a:lnSpc>
+                <a:spcPct val="100000"/>
+              </a:lnSpc>
+              <a:spcBef>
+                <a:spcPts val="0"/>
+              </a:spcBef>
+              <a:spcAft>
+                <a:spcPts val="0"/>
+              </a:spcAft>
+              <a:buClrTx/>
+              <a:buSzTx/>
+              <a:buFontTx/>
+              <a:buNone/>
+              <a:tabLst/>
+              <a:defRPr/>
+            </a:pPr>
+            <a:endParaRPr lang="en-US" dirty="0"/>
           </a:p>
         </p:txBody>
       </p:sp>
@@ -1411,7 +1364,7 @@
     </p:spTree>
     <p:extLst>
       <p:ext uri="{BB962C8B-B14F-4D97-AF65-F5344CB8AC3E}">
-        <p14:creationId xmlns:p14="http://schemas.microsoft.com/office/powerpoint/2010/main" val="321616863"/>
+        <p14:creationId xmlns:p14="http://schemas.microsoft.com/office/powerpoint/2010/main" val="3333302820"/>
       </p:ext>
     </p:extLst>
   </p:cSld>
@@ -1474,7 +1427,7 @@
                 <a:effectLst/>
                 <a:latin typeface="+mn-lt"/>
               </a:rPr>
-              <a:t>At its core, a transformer contains a stack of Encoder and Decoder layers. To avoid confusion, we will refer to the individual layer as an Encoder or a Decoder and will use Encoder stack or Decoder stack for a group of Encoder layers.</a:t>
+              <a:t>We begin with a simple image…  first off, the Transformer architecture excels at handling text data which is inherently sequential.  It takes a text sequence as input and produces another text sequence as output;  for example, to translate an input English sentence to Spanish.</a:t>
             </a:r>
           </a:p>
           <a:p>
@@ -1495,6 +1448,146 @@
                   <a:srgbClr val="292929"/>
                 </a:solidFill>
                 <a:effectLst/>
+                <a:latin typeface="charter"/>
+              </a:rPr>
+              <a:t>As opposed to directional models, which read the text input sequentially (left-to-right or right-to-left), the Transformer encoder reads the entire sequence of words at once. Therefore, it is considered bidirectional, though it would be more accurate to say that it’s non-directional. This characteristic allows the model to learn the context of a word based on </a:t>
+            </a:r>
+            <a:r>
+              <a:rPr lang="en-US" b="1" i="0" dirty="0">
+                <a:solidFill>
+                  <a:srgbClr val="292929"/>
+                </a:solidFill>
+                <a:effectLst/>
+                <a:latin typeface="charter"/>
+              </a:rPr>
+              <a:t>all</a:t>
+            </a:r>
+            <a:r>
+              <a:rPr lang="en-US" b="0" i="0" dirty="0">
+                <a:solidFill>
+                  <a:srgbClr val="292929"/>
+                </a:solidFill>
+                <a:effectLst/>
+                <a:latin typeface="charter"/>
+              </a:rPr>
+              <a:t> of its surroundings (left and right of the word).</a:t>
+            </a:r>
+            <a:endParaRPr lang="en-US" dirty="0">
+              <a:latin typeface="+mn-lt"/>
+            </a:endParaRPr>
+          </a:p>
+        </p:txBody>
+      </p:sp>
+      <p:sp>
+        <p:nvSpPr>
+          <p:cNvPr id="4" name="Slide Number Placeholder 3"/>
+          <p:cNvSpPr>
+            <a:spLocks noGrp="1"/>
+          </p:cNvSpPr>
+          <p:nvPr>
+            <p:ph type="sldNum" sz="quarter" idx="5"/>
+          </p:nvPr>
+        </p:nvSpPr>
+        <p:spPr/>
+        <p:txBody>
+          <a:bodyPr/>
+          <a:lstStyle/>
+          <a:p>
+            <a:fld id="{3148858F-F1DB-4027-9C85-CCA6849540DD}" type="slidenum">
+              <a:rPr lang="en-US" smtClean="0"/>
+              <a:t>17</a:t>
+            </a:fld>
+            <a:endParaRPr lang="en-US"/>
+          </a:p>
+        </p:txBody>
+      </p:sp>
+    </p:spTree>
+    <p:extLst>
+      <p:ext uri="{BB962C8B-B14F-4D97-AF65-F5344CB8AC3E}">
+        <p14:creationId xmlns:p14="http://schemas.microsoft.com/office/powerpoint/2010/main" val="321616863"/>
+      </p:ext>
+    </p:extLst>
+  </p:cSld>
+  <p:clrMapOvr>
+    <a:masterClrMapping/>
+  </p:clrMapOvr>
+</p:notes>
+</file>
+
+<file path=ppt/notesSlides/notesSlide18.xml><?xml version="1.0" encoding="utf-8"?>
+<p:notes xmlns:a="http://schemas.openxmlformats.org/drawingml/2006/main" xmlns:r="http://schemas.openxmlformats.org/officeDocument/2006/relationships" xmlns:p="http://schemas.openxmlformats.org/presentationml/2006/main">
+  <p:cSld>
+    <p:spTree>
+      <p:nvGrpSpPr>
+        <p:cNvPr id="1" name=""/>
+        <p:cNvGrpSpPr/>
+        <p:nvPr/>
+      </p:nvGrpSpPr>
+      <p:grpSpPr>
+        <a:xfrm>
+          <a:off x="0" y="0"/>
+          <a:ext cx="0" cy="0"/>
+          <a:chOff x="0" y="0"/>
+          <a:chExt cx="0" cy="0"/>
+        </a:xfrm>
+      </p:grpSpPr>
+      <p:sp>
+        <p:nvSpPr>
+          <p:cNvPr id="2" name="Slide Image Placeholder 1"/>
+          <p:cNvSpPr>
+            <a:spLocks noGrp="1" noRot="1" noChangeAspect="1"/>
+          </p:cNvSpPr>
+          <p:nvPr>
+            <p:ph type="sldImg"/>
+          </p:nvPr>
+        </p:nvSpPr>
+        <p:spPr/>
+      </p:sp>
+      <p:sp>
+        <p:nvSpPr>
+          <p:cNvPr id="3" name="Notes Placeholder 2"/>
+          <p:cNvSpPr>
+            <a:spLocks noGrp="1"/>
+          </p:cNvSpPr>
+          <p:nvPr>
+            <p:ph type="body" idx="1"/>
+          </p:nvPr>
+        </p:nvSpPr>
+        <p:spPr/>
+        <p:txBody>
+          <a:bodyPr/>
+          <a:lstStyle/>
+          <a:p>
+            <a:pPr algn="l"/>
+            <a:r>
+              <a:rPr lang="en-US" b="0" i="0" dirty="0">
+                <a:solidFill>
+                  <a:srgbClr val="292929"/>
+                </a:solidFill>
+                <a:effectLst/>
+                <a:latin typeface="+mn-lt"/>
+              </a:rPr>
+              <a:t>At its core, a transformer contains a stack of Encoder and Decoder layers. To avoid confusion, we will refer to the individual layer as an Encoder or a Decoder and will use Encoder stack or Decoder stack for a group of Encoder layers.</a:t>
+            </a:r>
+          </a:p>
+          <a:p>
+            <a:pPr algn="l"/>
+            <a:endParaRPr lang="en-US" b="0" i="0" dirty="0">
+              <a:solidFill>
+                <a:srgbClr val="292929"/>
+              </a:solidFill>
+              <a:effectLst/>
+              <a:latin typeface="+mn-lt"/>
+            </a:endParaRPr>
+          </a:p>
+          <a:p>
+            <a:pPr algn="l"/>
+            <a:r>
+              <a:rPr lang="en-US" b="0" i="0" dirty="0">
+                <a:solidFill>
+                  <a:srgbClr val="292929"/>
+                </a:solidFill>
+                <a:effectLst/>
                 <a:latin typeface="+mn-lt"/>
               </a:rPr>
               <a:t>The Encoder stack and the Decoder stack each have their corresponding Embedding layers for their respective inputs. And finally, there is an Output layer to generate the final output.</a:t>
@@ -1523,7 +1616,7 @@
           <a:p>
             <a:fld id="{3148858F-F1DB-4027-9C85-CCA6849540DD}" type="slidenum">
               <a:rPr lang="en-US" smtClean="0"/>
-              <a:t>17</a:t>
+              <a:t>18</a:t>
             </a:fld>
             <a:endParaRPr lang="en-US"/>
           </a:p>
@@ -2345,7 +2438,7 @@
     </p:spTree>
     <p:extLst>
       <p:ext uri="{BB962C8B-B14F-4D97-AF65-F5344CB8AC3E}">
-        <p14:creationId xmlns:p14="http://schemas.microsoft.com/office/powerpoint/2010/main" val="1985664105"/>
+        <p14:creationId xmlns:p14="http://schemas.microsoft.com/office/powerpoint/2010/main" val="1306232887"/>
       </p:ext>
     </p:extLst>
   </p:cSld>
@@ -2399,14 +2492,23 @@
           <a:bodyPr/>
           <a:lstStyle/>
           <a:p>
-            <a:pPr algn="l"/>
-            <a:r>
-              <a:rPr lang="en-US" dirty="0"/>
-              <a:t>Now that you’ve completed a hands-on exercise, let’s consider some of the building blocks that make transformers unique.  Note: I will not discuss word embeddings as that topic was covered in the last workshop of our NLP sequence.  In this mini-lecture, we will cover three building blocks: 1) layer norm, 2) positional encoding, and 3) skip connections.  Because attention is such an important topic, it is covered in our next workshop.  </a:t>
-            </a:r>
-          </a:p>
-          <a:p>
-            <a:pPr algn="l"/>
+            <a:pPr marL="0" marR="0" lvl="0" indent="0" algn="l" defTabSz="914400" rtl="0" eaLnBrk="1" fontAlgn="auto" latinLnBrk="0" hangingPunct="1">
+              <a:lnSpc>
+                <a:spcPct val="100000"/>
+              </a:lnSpc>
+              <a:spcBef>
+                <a:spcPts val="0"/>
+              </a:spcBef>
+              <a:spcAft>
+                <a:spcPts val="0"/>
+              </a:spcAft>
+              <a:buClrTx/>
+              <a:buSzTx/>
+              <a:buFontTx/>
+              <a:buNone/>
+              <a:tabLst/>
+              <a:defRPr/>
+            </a:pPr>
             <a:endParaRPr lang="en-US" dirty="0"/>
           </a:p>
         </p:txBody>
@@ -2437,7 +2539,7 @@
     </p:spTree>
     <p:extLst>
       <p:ext uri="{BB962C8B-B14F-4D97-AF65-F5344CB8AC3E}">
-        <p14:creationId xmlns:p14="http://schemas.microsoft.com/office/powerpoint/2010/main" val="1570214374"/>
+        <p14:creationId xmlns:p14="http://schemas.microsoft.com/office/powerpoint/2010/main" val="1985664105"/>
       </p:ext>
     </p:extLst>
   </p:cSld>
@@ -2493,13 +2595,13 @@
           <a:p>
             <a:pPr algn="l"/>
             <a:r>
-              <a:rPr lang="en-US" b="1" dirty="0"/>
-              <a:t>Layer norm </a:t>
-            </a:r>
-            <a:r>
               <a:rPr lang="en-US" dirty="0"/>
-              <a:t>is our first building block.  In transformers, we usually apply a regularization step called layer normalization, or layer norm, to the outputs of a layer, as shown here on the left. Layer norm belongs to the class of regularization techniques, such as dropout and batchnorm, which help control overfitting by keeping the values flowing through the network from getting too big or too small. (Vanishing / exploding gradients)  The layer norm step learns to adjust the values coming out of a layer so that they approximate the shape of a Gaussian bump with a mean of 0 and standard deviation of 1.</a:t>
-            </a:r>
+              <a:t>Now that you’ve completed a hands-on exercise, let’s consider some of the building blocks that make transformers unique.  Note: I will not discuss word embeddings as that topic was covered in the last workshop of our NLP sequence.  In this mini-lecture, we will cover three building blocks: 1) layer norm, 2) positional encoding, and 3) skip connections.  Because attention is such an important topic, it is covered in our next workshop.  </a:t>
+            </a:r>
+          </a:p>
+          <a:p>
+            <a:pPr algn="l"/>
+            <a:endParaRPr lang="en-US" dirty="0"/>
           </a:p>
         </p:txBody>
       </p:sp>
@@ -2529,7 +2631,7 @@
     </p:spTree>
     <p:extLst>
       <p:ext uri="{BB962C8B-B14F-4D97-AF65-F5344CB8AC3E}">
-        <p14:creationId xmlns:p14="http://schemas.microsoft.com/office/powerpoint/2010/main" val="3456021193"/>
+        <p14:creationId xmlns:p14="http://schemas.microsoft.com/office/powerpoint/2010/main" val="1570214374"/>
       </p:ext>
     </p:extLst>
   </p:cSld>
@@ -2686,7 +2788,7 @@
           <a:p>
             <a:fld id="{C3F78080-8D0A-4BE8-A5B4-CB115102D524}" type="datetimeFigureOut">
               <a:rPr lang="en-US" smtClean="0"/>
-              <a:t>7/6/2022</a:t>
+              <a:t>7/8/2022</a:t>
             </a:fld>
             <a:endParaRPr lang="en-US"/>
           </a:p>
@@ -2884,7 +2986,7 @@
           <a:p>
             <a:fld id="{C3F78080-8D0A-4BE8-A5B4-CB115102D524}" type="datetimeFigureOut">
               <a:rPr lang="en-US" smtClean="0"/>
-              <a:t>7/6/2022</a:t>
+              <a:t>7/8/2022</a:t>
             </a:fld>
             <a:endParaRPr lang="en-US"/>
           </a:p>
@@ -3092,7 +3194,7 @@
           <a:p>
             <a:fld id="{C3F78080-8D0A-4BE8-A5B4-CB115102D524}" type="datetimeFigureOut">
               <a:rPr lang="en-US" smtClean="0"/>
-              <a:t>7/6/2022</a:t>
+              <a:t>7/8/2022</a:t>
             </a:fld>
             <a:endParaRPr lang="en-US"/>
           </a:p>
@@ -3290,7 +3392,7 @@
           <a:p>
             <a:fld id="{C3F78080-8D0A-4BE8-A5B4-CB115102D524}" type="datetimeFigureOut">
               <a:rPr lang="en-US" smtClean="0"/>
-              <a:t>7/6/2022</a:t>
+              <a:t>7/8/2022</a:t>
             </a:fld>
             <a:endParaRPr lang="en-US"/>
           </a:p>
@@ -3565,7 +3667,7 @@
           <a:p>
             <a:fld id="{C3F78080-8D0A-4BE8-A5B4-CB115102D524}" type="datetimeFigureOut">
               <a:rPr lang="en-US" smtClean="0"/>
-              <a:t>7/6/2022</a:t>
+              <a:t>7/8/2022</a:t>
             </a:fld>
             <a:endParaRPr lang="en-US"/>
           </a:p>
@@ -3830,7 +3932,7 @@
           <a:p>
             <a:fld id="{C3F78080-8D0A-4BE8-A5B4-CB115102D524}" type="datetimeFigureOut">
               <a:rPr lang="en-US" smtClean="0"/>
-              <a:t>7/6/2022</a:t>
+              <a:t>7/8/2022</a:t>
             </a:fld>
             <a:endParaRPr lang="en-US"/>
           </a:p>
@@ -4242,7 +4344,7 @@
           <a:p>
             <a:fld id="{C3F78080-8D0A-4BE8-A5B4-CB115102D524}" type="datetimeFigureOut">
               <a:rPr lang="en-US" smtClean="0"/>
-              <a:t>7/6/2022</a:t>
+              <a:t>7/8/2022</a:t>
             </a:fld>
             <a:endParaRPr lang="en-US"/>
           </a:p>
@@ -4383,7 +4485,7 @@
           <a:p>
             <a:fld id="{C3F78080-8D0A-4BE8-A5B4-CB115102D524}" type="datetimeFigureOut">
               <a:rPr lang="en-US" smtClean="0"/>
-              <a:t>7/6/2022</a:t>
+              <a:t>7/8/2022</a:t>
             </a:fld>
             <a:endParaRPr lang="en-US"/>
           </a:p>
@@ -4496,7 +4598,7 @@
           <a:p>
             <a:fld id="{C3F78080-8D0A-4BE8-A5B4-CB115102D524}" type="datetimeFigureOut">
               <a:rPr lang="en-US" smtClean="0"/>
-              <a:t>7/6/2022</a:t>
+              <a:t>7/8/2022</a:t>
             </a:fld>
             <a:endParaRPr lang="en-US"/>
           </a:p>
@@ -4807,7 +4909,7 @@
           <a:p>
             <a:fld id="{C3F78080-8D0A-4BE8-A5B4-CB115102D524}" type="datetimeFigureOut">
               <a:rPr lang="en-US" smtClean="0"/>
-              <a:t>7/6/2022</a:t>
+              <a:t>7/8/2022</a:t>
             </a:fld>
             <a:endParaRPr lang="en-US"/>
           </a:p>
@@ -5095,7 +5197,7 @@
           <a:p>
             <a:fld id="{C3F78080-8D0A-4BE8-A5B4-CB115102D524}" type="datetimeFigureOut">
               <a:rPr lang="en-US" smtClean="0"/>
-              <a:t>7/6/2022</a:t>
+              <a:t>7/8/2022</a:t>
             </a:fld>
             <a:endParaRPr lang="en-US"/>
           </a:p>
@@ -5336,7 +5438,7 @@
           <a:p>
             <a:fld id="{C3F78080-8D0A-4BE8-A5B4-CB115102D524}" type="datetimeFigureOut">
               <a:rPr lang="en-US" smtClean="0"/>
-              <a:t>7/6/2022</a:t>
+              <a:t>7/8/2022</a:t>
             </a:fld>
             <a:endParaRPr lang="en-US"/>
           </a:p>
@@ -5869,6 +5971,253 @@
       </p:grpSpPr>
       <p:pic>
         <p:nvPicPr>
+          <p:cNvPr id="4098" name="Picture 2" descr="F20018">
+            <a:extLst>
+              <a:ext uri="{FF2B5EF4-FFF2-40B4-BE49-F238E27FC236}">
+                <a16:creationId xmlns:a16="http://schemas.microsoft.com/office/drawing/2014/main" id="{9D5C494A-0CBE-4B64-9D77-71FFFC718D89}"/>
+              </a:ext>
+            </a:extLst>
+          </p:cNvPr>
+          <p:cNvPicPr>
+            <a:picLocks noChangeAspect="1" noChangeArrowheads="1"/>
+          </p:cNvPicPr>
+          <p:nvPr/>
+        </p:nvPicPr>
+        <p:blipFill>
+          <a:blip r:embed="rId3">
+            <a:extLst>
+              <a:ext uri="{28A0092B-C50C-407E-A947-70E740481C1C}">
+                <a14:useLocalDpi xmlns:a14="http://schemas.microsoft.com/office/drawing/2010/main" val="0"/>
+              </a:ext>
+            </a:extLst>
+          </a:blip>
+          <a:srcRect/>
+          <a:stretch>
+            <a:fillRect/>
+          </a:stretch>
+        </p:blipFill>
+        <p:spPr bwMode="auto">
+          <a:xfrm>
+            <a:off x="2651828" y="2877302"/>
+            <a:ext cx="6888344" cy="1103396"/>
+          </a:xfrm>
+          <a:prstGeom prst="rect">
+            <a:avLst/>
+          </a:prstGeom>
+          <a:noFill/>
+          <a:extLst>
+            <a:ext uri="{909E8E84-426E-40DD-AFC4-6F175D3DCCD1}">
+              <a14:hiddenFill xmlns:a14="http://schemas.microsoft.com/office/drawing/2010/main">
+                <a:solidFill>
+                  <a:srgbClr val="FFFFFF"/>
+                </a:solidFill>
+              </a14:hiddenFill>
+            </a:ext>
+          </a:extLst>
+        </p:spPr>
+      </p:pic>
+      <p:sp>
+        <p:nvSpPr>
+          <p:cNvPr id="3" name="TextBox 2">
+            <a:extLst>
+              <a:ext uri="{FF2B5EF4-FFF2-40B4-BE49-F238E27FC236}">
+                <a16:creationId xmlns:a16="http://schemas.microsoft.com/office/drawing/2014/main" id="{8B50B82C-A1EF-42B8-9CB8-B057F2C81533}"/>
+              </a:ext>
+            </a:extLst>
+          </p:cNvPr>
+          <p:cNvSpPr txBox="1"/>
+          <p:nvPr/>
+        </p:nvSpPr>
+        <p:spPr>
+          <a:xfrm>
+            <a:off x="0" y="6550223"/>
+            <a:ext cx="12192000" cy="307777"/>
+          </a:xfrm>
+          <a:prstGeom prst="rect">
+            <a:avLst/>
+          </a:prstGeom>
+          <a:noFill/>
+        </p:spPr>
+        <p:txBody>
+          <a:bodyPr wrap="square" rtlCol="0">
+            <a:spAutoFit/>
+          </a:bodyPr>
+          <a:lstStyle/>
+          <a:p>
+            <a:r>
+              <a:rPr lang="en-US" sz="1400" dirty="0">
+                <a:solidFill>
+                  <a:schemeClr val="tx1">
+                    <a:lumMod val="65000"/>
+                    <a:lumOff val="35000"/>
+                  </a:schemeClr>
+                </a:solidFill>
+                <a:latin typeface="+mj-lt"/>
+                <a:ea typeface="Verdana" panose="020B0604030504040204" pitchFamily="34" charset="0"/>
+              </a:rPr>
+              <a:t>Source: Glassner, A. (2021). </a:t>
+            </a:r>
+            <a:r>
+              <a:rPr lang="en-US" sz="1400" i="1" dirty="0">
+                <a:solidFill>
+                  <a:schemeClr val="tx1">
+                    <a:lumMod val="65000"/>
+                    <a:lumOff val="35000"/>
+                  </a:schemeClr>
+                </a:solidFill>
+                <a:latin typeface="+mj-lt"/>
+                <a:ea typeface="Verdana" panose="020B0604030504040204" pitchFamily="34" charset="0"/>
+              </a:rPr>
+              <a:t>Deep learning: A visual approach</a:t>
+            </a:r>
+            <a:r>
+              <a:rPr lang="en-US" sz="1400" dirty="0">
+                <a:solidFill>
+                  <a:schemeClr val="tx1">
+                    <a:lumMod val="65000"/>
+                    <a:lumOff val="35000"/>
+                  </a:schemeClr>
+                </a:solidFill>
+                <a:latin typeface="+mj-lt"/>
+                <a:ea typeface="Verdana" panose="020B0604030504040204" pitchFamily="34" charset="0"/>
+              </a:rPr>
+              <a:t>. </a:t>
+            </a:r>
+            <a:r>
+              <a:rPr lang="en-US" sz="1400" b="0" i="0" dirty="0">
+                <a:solidFill>
+                  <a:schemeClr val="tx1">
+                    <a:lumMod val="65000"/>
+                    <a:lumOff val="35000"/>
+                  </a:schemeClr>
+                </a:solidFill>
+                <a:effectLst/>
+                <a:latin typeface="+mj-lt"/>
+                <a:ea typeface="Verdana" panose="020B0604030504040204" pitchFamily="34" charset="0"/>
+              </a:rPr>
+              <a:t>San Francisco, CA: No Starch Press. (Chapter </a:t>
+            </a:r>
+            <a:r>
+              <a:rPr lang="en-US" sz="1400" dirty="0">
+                <a:solidFill>
+                  <a:schemeClr val="tx1">
+                    <a:lumMod val="65000"/>
+                    <a:lumOff val="35000"/>
+                  </a:schemeClr>
+                </a:solidFill>
+                <a:latin typeface="+mj-lt"/>
+                <a:ea typeface="Verdana" panose="020B0604030504040204" pitchFamily="34" charset="0"/>
+              </a:rPr>
+              <a:t>20</a:t>
+            </a:r>
+            <a:r>
+              <a:rPr lang="en-US" sz="1400" b="0" i="0" dirty="0">
+                <a:solidFill>
+                  <a:schemeClr val="tx1">
+                    <a:lumMod val="65000"/>
+                    <a:lumOff val="35000"/>
+                  </a:schemeClr>
+                </a:solidFill>
+                <a:effectLst/>
+                <a:latin typeface="+mj-lt"/>
+                <a:ea typeface="Verdana" panose="020B0604030504040204" pitchFamily="34" charset="0"/>
+              </a:rPr>
+              <a:t>)</a:t>
+            </a:r>
+            <a:endParaRPr lang="en-US" sz="1400" dirty="0">
+              <a:solidFill>
+                <a:schemeClr val="tx1">
+                  <a:lumMod val="65000"/>
+                  <a:lumOff val="35000"/>
+                </a:schemeClr>
+              </a:solidFill>
+              <a:latin typeface="+mj-lt"/>
+              <a:ea typeface="Verdana" panose="020B0604030504040204" pitchFamily="34" charset="0"/>
+            </a:endParaRPr>
+          </a:p>
+        </p:txBody>
+      </p:sp>
+      <p:pic>
+        <p:nvPicPr>
+          <p:cNvPr id="7" name="Picture 6">
+            <a:extLst>
+              <a:ext uri="{FF2B5EF4-FFF2-40B4-BE49-F238E27FC236}">
+                <a16:creationId xmlns:a16="http://schemas.microsoft.com/office/drawing/2014/main" id="{41EFA874-9B25-4772-88F0-BDE024D1DF70}"/>
+              </a:ext>
+            </a:extLst>
+          </p:cNvPr>
+          <p:cNvPicPr>
+            <a:picLocks noChangeAspect="1"/>
+          </p:cNvPicPr>
+          <p:nvPr/>
+        </p:nvPicPr>
+        <p:blipFill>
+          <a:blip r:embed="rId4"/>
+          <a:stretch>
+            <a:fillRect/>
+          </a:stretch>
+        </p:blipFill>
+        <p:spPr>
+          <a:xfrm>
+            <a:off x="-13855" y="18288"/>
+            <a:ext cx="2260600" cy="635000"/>
+          </a:xfrm>
+          <a:prstGeom prst="rect">
+            <a:avLst/>
+          </a:prstGeom>
+          <a:effectLst>
+            <a:outerShdw blurRad="50800" dist="38100" dir="2700000" algn="tl" rotWithShape="0">
+              <a:prstClr val="black">
+                <a:alpha val="40000"/>
+              </a:prstClr>
+            </a:outerShdw>
+          </a:effectLst>
+        </p:spPr>
+      </p:pic>
+    </p:spTree>
+    <p:extLst>
+      <p:ext uri="{BB962C8B-B14F-4D97-AF65-F5344CB8AC3E}">
+        <p14:creationId xmlns:p14="http://schemas.microsoft.com/office/powerpoint/2010/main" val="1565508497"/>
+      </p:ext>
+    </p:extLst>
+  </p:cSld>
+  <p:clrMapOvr>
+    <a:masterClrMapping/>
+  </p:clrMapOvr>
+  <mc:AlternateContent xmlns:mc="http://schemas.openxmlformats.org/markup-compatibility/2006" xmlns:p14="http://schemas.microsoft.com/office/powerpoint/2010/main">
+    <mc:Choice Requires="p14">
+      <p:transition spd="med" p14:dur="700">
+        <p:fade/>
+      </p:transition>
+    </mc:Choice>
+    <mc:Fallback xmlns="">
+      <p:transition spd="med">
+        <p:fade/>
+      </p:transition>
+    </mc:Fallback>
+  </mc:AlternateContent>
+</p:sld>
+</file>
+
+<file path=ppt/slides/slide11.xml><?xml version="1.0" encoding="utf-8"?>
+<p:sld xmlns:a="http://schemas.openxmlformats.org/drawingml/2006/main" xmlns:r="http://schemas.openxmlformats.org/officeDocument/2006/relationships" xmlns:p="http://schemas.openxmlformats.org/presentationml/2006/main">
+  <p:cSld>
+    <p:spTree>
+      <p:nvGrpSpPr>
+        <p:cNvPr id="1" name=""/>
+        <p:cNvGrpSpPr/>
+        <p:nvPr/>
+      </p:nvGrpSpPr>
+      <p:grpSpPr>
+        <a:xfrm>
+          <a:off x="0" y="0"/>
+          <a:ext cx="0" cy="0"/>
+          <a:chOff x="0" y="0"/>
+          <a:chExt cx="0" cy="0"/>
+        </a:xfrm>
+      </p:grpSpPr>
+      <p:pic>
+        <p:nvPicPr>
           <p:cNvPr id="2050" name="Picture 2" descr="F20019">
             <a:extLst>
               <a:ext uri="{FF2B5EF4-FFF2-40B4-BE49-F238E27FC236}">
@@ -6107,7 +6456,7 @@
 </p:sld>
 </file>
 
-<file path=ppt/slides/slide11.xml><?xml version="1.0" encoding="utf-8"?>
+<file path=ppt/slides/slide12.xml><?xml version="1.0" encoding="utf-8"?>
 <p:sld xmlns:a="http://schemas.openxmlformats.org/drawingml/2006/main" xmlns:r="http://schemas.openxmlformats.org/officeDocument/2006/relationships" xmlns:p="http://schemas.openxmlformats.org/presentationml/2006/main">
   <p:cSld>
     <p:spTree>
@@ -6364,7 +6713,7 @@
 </p:sld>
 </file>
 
-<file path=ppt/slides/slide12.xml><?xml version="1.0" encoding="utf-8"?>
+<file path=ppt/slides/slide13.xml><?xml version="1.0" encoding="utf-8"?>
 <p:sld xmlns:a="http://schemas.openxmlformats.org/drawingml/2006/main" xmlns:r="http://schemas.openxmlformats.org/officeDocument/2006/relationships" xmlns:p="http://schemas.openxmlformats.org/presentationml/2006/main">
   <p:cSld>
     <p:spTree>
@@ -6658,7 +7007,7 @@
 </p:sld>
 </file>
 
-<file path=ppt/slides/slide13.xml><?xml version="1.0" encoding="utf-8"?>
+<file path=ppt/slides/slide14.xml><?xml version="1.0" encoding="utf-8"?>
 <p:sld xmlns:a="http://schemas.openxmlformats.org/drawingml/2006/main" xmlns:r="http://schemas.openxmlformats.org/officeDocument/2006/relationships" xmlns:p="http://schemas.openxmlformats.org/presentationml/2006/main">
   <p:cSld>
     <p:spTree>
@@ -6787,73 +7136,6 @@
     <p:extLst>
       <p:ext uri="{BB962C8B-B14F-4D97-AF65-F5344CB8AC3E}">
         <p14:creationId xmlns:p14="http://schemas.microsoft.com/office/powerpoint/2010/main" val="3902517881"/>
-      </p:ext>
-    </p:extLst>
-  </p:cSld>
-  <p:clrMapOvr>
-    <a:masterClrMapping/>
-  </p:clrMapOvr>
-  <mc:AlternateContent xmlns:mc="http://schemas.openxmlformats.org/markup-compatibility/2006" xmlns:p14="http://schemas.microsoft.com/office/powerpoint/2010/main">
-    <mc:Choice Requires="p14">
-      <p:transition spd="med" p14:dur="700">
-        <p:fade/>
-      </p:transition>
-    </mc:Choice>
-    <mc:Fallback xmlns="">
-      <p:transition spd="med">
-        <p:fade/>
-      </p:transition>
-    </mc:Fallback>
-  </mc:AlternateContent>
-</p:sld>
-</file>
-
-<file path=ppt/slides/slide14.xml><?xml version="1.0" encoding="utf-8"?>
-<p:sld xmlns:a="http://schemas.openxmlformats.org/drawingml/2006/main" xmlns:r="http://schemas.openxmlformats.org/officeDocument/2006/relationships" xmlns:p="http://schemas.openxmlformats.org/presentationml/2006/main">
-  <p:cSld>
-    <p:spTree>
-      <p:nvGrpSpPr>
-        <p:cNvPr id="1" name=""/>
-        <p:cNvGrpSpPr/>
-        <p:nvPr/>
-      </p:nvGrpSpPr>
-      <p:grpSpPr>
-        <a:xfrm>
-          <a:off x="0" y="0"/>
-          <a:ext cx="0" cy="0"/>
-          <a:chOff x="0" y="0"/>
-          <a:chExt cx="0" cy="0"/>
-        </a:xfrm>
-      </p:grpSpPr>
-      <p:sp>
-        <p:nvSpPr>
-          <p:cNvPr id="4" name="Title 3">
-            <a:extLst>
-              <a:ext uri="{FF2B5EF4-FFF2-40B4-BE49-F238E27FC236}">
-                <a16:creationId xmlns:a16="http://schemas.microsoft.com/office/drawing/2014/main" id="{5EBC47B3-2231-4C7D-9F46-767148520D27}"/>
-              </a:ext>
-            </a:extLst>
-          </p:cNvPr>
-          <p:cNvSpPr>
-            <a:spLocks noGrp="1"/>
-          </p:cNvSpPr>
-          <p:nvPr>
-            <p:ph type="title"/>
-          </p:nvPr>
-        </p:nvSpPr>
-        <p:spPr/>
-        <p:txBody>
-          <a:bodyPr/>
-          <a:lstStyle/>
-          <a:p>
-            <a:endParaRPr lang="en-US" dirty="0"/>
-          </a:p>
-        </p:txBody>
-      </p:sp>
-    </p:spTree>
-    <p:extLst>
-      <p:ext uri="{BB962C8B-B14F-4D97-AF65-F5344CB8AC3E}">
-        <p14:creationId xmlns:p14="http://schemas.microsoft.com/office/powerpoint/2010/main" val="2516832135"/>
       </p:ext>
     </p:extLst>
   </p:cSld>
@@ -6892,6 +7174,73 @@
           <a:chExt cx="0" cy="0"/>
         </a:xfrm>
       </p:grpSpPr>
+      <p:sp>
+        <p:nvSpPr>
+          <p:cNvPr id="4" name="Title 3">
+            <a:extLst>
+              <a:ext uri="{FF2B5EF4-FFF2-40B4-BE49-F238E27FC236}">
+                <a16:creationId xmlns:a16="http://schemas.microsoft.com/office/drawing/2014/main" id="{5EBC47B3-2231-4C7D-9F46-767148520D27}"/>
+              </a:ext>
+            </a:extLst>
+          </p:cNvPr>
+          <p:cNvSpPr>
+            <a:spLocks noGrp="1"/>
+          </p:cNvSpPr>
+          <p:nvPr>
+            <p:ph type="title"/>
+          </p:nvPr>
+        </p:nvSpPr>
+        <p:spPr/>
+        <p:txBody>
+          <a:bodyPr/>
+          <a:lstStyle/>
+          <a:p>
+            <a:endParaRPr lang="en-US" dirty="0"/>
+          </a:p>
+        </p:txBody>
+      </p:sp>
+    </p:spTree>
+    <p:extLst>
+      <p:ext uri="{BB962C8B-B14F-4D97-AF65-F5344CB8AC3E}">
+        <p14:creationId xmlns:p14="http://schemas.microsoft.com/office/powerpoint/2010/main" val="2516832135"/>
+      </p:ext>
+    </p:extLst>
+  </p:cSld>
+  <p:clrMapOvr>
+    <a:masterClrMapping/>
+  </p:clrMapOvr>
+  <mc:AlternateContent xmlns:mc="http://schemas.openxmlformats.org/markup-compatibility/2006" xmlns:p14="http://schemas.microsoft.com/office/powerpoint/2010/main">
+    <mc:Choice Requires="p14">
+      <p:transition spd="med" p14:dur="700">
+        <p:fade/>
+      </p:transition>
+    </mc:Choice>
+    <mc:Fallback xmlns="">
+      <p:transition spd="med">
+        <p:fade/>
+      </p:transition>
+    </mc:Fallback>
+  </mc:AlternateContent>
+</p:sld>
+</file>
+
+<file path=ppt/slides/slide16.xml><?xml version="1.0" encoding="utf-8"?>
+<p:sld xmlns:a="http://schemas.openxmlformats.org/drawingml/2006/main" xmlns:r="http://schemas.openxmlformats.org/officeDocument/2006/relationships" xmlns:p="http://schemas.openxmlformats.org/presentationml/2006/main">
+  <p:cSld>
+    <p:spTree>
+      <p:nvGrpSpPr>
+        <p:cNvPr id="1" name=""/>
+        <p:cNvGrpSpPr/>
+        <p:nvPr/>
+      </p:nvGrpSpPr>
+      <p:grpSpPr>
+        <a:xfrm>
+          <a:off x="0" y="0"/>
+          <a:ext cx="0" cy="0"/>
+          <a:chOff x="0" y="0"/>
+          <a:chExt cx="0" cy="0"/>
+        </a:xfrm>
+      </p:grpSpPr>
       <p:pic>
         <p:nvPicPr>
           <p:cNvPr id="3" name="Picture 2">
@@ -7025,7 +7374,7 @@
 </p:sld>
 </file>
 
-<file path=ppt/slides/slide16.xml><?xml version="1.0" encoding="utf-8"?>
+<file path=ppt/slides/slide17.xml><?xml version="1.0" encoding="utf-8"?>
 <p:sld xmlns:a="http://schemas.openxmlformats.org/drawingml/2006/main" xmlns:r="http://schemas.openxmlformats.org/officeDocument/2006/relationships" xmlns:p="http://schemas.openxmlformats.org/presentationml/2006/main">
   <p:cSld>
     <p:spTree>
@@ -7191,7 +7540,7 @@
 </p:sld>
 </file>
 
-<file path=ppt/slides/slide17.xml><?xml version="1.0" encoding="utf-8"?>
+<file path=ppt/slides/slide18.xml><?xml version="1.0" encoding="utf-8"?>
 <p:sld xmlns:a="http://schemas.openxmlformats.org/drawingml/2006/main" xmlns:r="http://schemas.openxmlformats.org/officeDocument/2006/relationships" xmlns:p="http://schemas.openxmlformats.org/presentationml/2006/main">
   <p:cSld>
     <p:spTree>
@@ -8199,10 +8548,10 @@
       </p:grpSpPr>
       <p:pic>
         <p:nvPicPr>
-          <p:cNvPr id="3" name="Picture 2">
-            <a:extLst>
-              <a:ext uri="{FF2B5EF4-FFF2-40B4-BE49-F238E27FC236}">
-                <a16:creationId xmlns:a16="http://schemas.microsoft.com/office/drawing/2014/main" id="{88CC7D4C-7D31-4E3C-92F7-200A7C7F587F}"/>
+          <p:cNvPr id="3" name="Picture 2" descr="Diagram&#10;&#10;Description automatically generated">
+            <a:extLst>
+              <a:ext uri="{FF2B5EF4-FFF2-40B4-BE49-F238E27FC236}">
+                <a16:creationId xmlns:a16="http://schemas.microsoft.com/office/drawing/2014/main" id="{67EF8A62-1530-48BE-8523-CB507D8763FF}"/>
               </a:ext>
             </a:extLst>
           </p:cNvPr>
@@ -8212,122 +8561,31 @@
           <p:nvPr/>
         </p:nvPicPr>
         <p:blipFill>
-          <a:blip r:embed="rId3"/>
+          <a:blip r:embed="rId3">
+            <a:extLst>
+              <a:ext uri="{28A0092B-C50C-407E-A947-70E740481C1C}">
+                <a14:useLocalDpi xmlns:a14="http://schemas.microsoft.com/office/drawing/2010/main" val="0"/>
+              </a:ext>
+            </a:extLst>
+          </a:blip>
           <a:stretch>
             <a:fillRect/>
           </a:stretch>
         </p:blipFill>
         <p:spPr>
           <a:xfrm>
-            <a:off x="0" y="365760"/>
-            <a:ext cx="3233668" cy="805144"/>
+            <a:off x="3177607" y="566976"/>
+            <a:ext cx="5836786" cy="5724047"/>
           </a:xfrm>
           <a:prstGeom prst="rect">
             <a:avLst/>
           </a:prstGeom>
         </p:spPr>
       </p:pic>
-      <p:sp>
-        <p:nvSpPr>
-          <p:cNvPr id="4" name="Title 1">
-            <a:extLst>
-              <a:ext uri="{FF2B5EF4-FFF2-40B4-BE49-F238E27FC236}">
-                <a16:creationId xmlns:a16="http://schemas.microsoft.com/office/drawing/2014/main" id="{474EB2BC-3221-47A1-8ADF-BF3126732B5F}"/>
-              </a:ext>
-            </a:extLst>
-          </p:cNvPr>
-          <p:cNvSpPr txBox="1">
-            <a:spLocks/>
-          </p:cNvSpPr>
-          <p:nvPr/>
-        </p:nvSpPr>
-        <p:spPr>
-          <a:xfrm>
-            <a:off x="0" y="2705764"/>
-            <a:ext cx="12192000" cy="1446472"/>
-          </a:xfrm>
-          <a:prstGeom prst="rect">
-            <a:avLst/>
-          </a:prstGeom>
-          <a:noFill/>
-        </p:spPr>
-        <p:txBody>
-          <a:bodyPr vert="horz" lIns="91440" tIns="45720" rIns="91440" bIns="45720" rtlCol="0" anchor="ctr">
-            <a:noAutofit/>
-          </a:bodyPr>
-          <a:lstStyle>
-            <a:lvl1pPr algn="l" defTabSz="914400" rtl="0" eaLnBrk="1" latinLnBrk="0" hangingPunct="1">
-              <a:lnSpc>
-                <a:spcPct val="90000"/>
-              </a:lnSpc>
-              <a:spcBef>
-                <a:spcPct val="0"/>
-              </a:spcBef>
-              <a:buNone/>
-              <a:defRPr sz="4400" kern="1200">
-                <a:solidFill>
-                  <a:schemeClr val="tx1"/>
-                </a:solidFill>
-                <a:latin typeface="+mj-lt"/>
-                <a:ea typeface="+mj-ea"/>
-                <a:cs typeface="+mj-cs"/>
-              </a:defRPr>
-            </a:lvl1pPr>
-          </a:lstStyle>
-          <a:p>
-            <a:pPr algn="ctr"/>
-            <a:r>
-              <a:rPr lang="en-US" sz="3600" dirty="0">
-                <a:solidFill>
-                  <a:schemeClr val="tx1">
-                    <a:lumMod val="65000"/>
-                    <a:lumOff val="35000"/>
-                  </a:schemeClr>
-                </a:solidFill>
-                <a:latin typeface="Palatino Linotype" panose="02040502050505030304" pitchFamily="18" charset="0"/>
-              </a:rPr>
-              <a:t>Transformers Introduction</a:t>
-            </a:r>
-            <a:br>
-              <a:rPr lang="en-US" sz="3600" dirty="0">
-                <a:solidFill>
-                  <a:schemeClr val="tx1">
-                    <a:lumMod val="65000"/>
-                    <a:lumOff val="35000"/>
-                  </a:schemeClr>
-                </a:solidFill>
-                <a:latin typeface="Palatino Linotype" panose="02040502050505030304" pitchFamily="18" charset="0"/>
-              </a:rPr>
-            </a:br>
-            <a:r>
-              <a:rPr lang="en-US" sz="3600" dirty="0">
-                <a:solidFill>
-                  <a:schemeClr val="tx1">
-                    <a:lumMod val="65000"/>
-                    <a:lumOff val="35000"/>
-                  </a:schemeClr>
-                </a:solidFill>
-                <a:latin typeface="Palatino Linotype" panose="02040502050505030304" pitchFamily="18" charset="0"/>
-              </a:rPr>
-              <a:t>01.2_transformer_intro.ipynb</a:t>
-            </a:r>
-            <a:endParaRPr lang="en-US" sz="3600" dirty="0">
-              <a:solidFill>
-                <a:schemeClr val="tx1">
-                  <a:lumMod val="65000"/>
-                  <a:lumOff val="35000"/>
-                </a:schemeClr>
-              </a:solidFill>
-              <a:latin typeface="Palatino Linotype" panose="02040502050505030304" pitchFamily="18" charset="0"/>
-              <a:cs typeface="Segoe UI Light" panose="020B0502040204020203" pitchFamily="34" charset="0"/>
-            </a:endParaRPr>
-          </a:p>
-        </p:txBody>
-      </p:sp>
     </p:spTree>
     <p:extLst>
       <p:ext uri="{BB962C8B-B14F-4D97-AF65-F5344CB8AC3E}">
-        <p14:creationId xmlns:p14="http://schemas.microsoft.com/office/powerpoint/2010/main" val="2261991877"/>
+        <p14:creationId xmlns:p14="http://schemas.microsoft.com/office/powerpoint/2010/main" val="2334865424"/>
       </p:ext>
     </p:extLst>
   </p:cSld>
@@ -8366,133 +8624,12 @@
           <a:chExt cx="0" cy="0"/>
         </a:xfrm>
       </p:grpSpPr>
-      <p:sp>
-        <p:nvSpPr>
-          <p:cNvPr id="3" name="TextBox 2">
-            <a:extLst>
-              <a:ext uri="{FF2B5EF4-FFF2-40B4-BE49-F238E27FC236}">
-                <a16:creationId xmlns:a16="http://schemas.microsoft.com/office/drawing/2014/main" id="{C1E53685-A9F7-4FE0-ABDB-9B755F275882}"/>
-              </a:ext>
-            </a:extLst>
-          </p:cNvPr>
-          <p:cNvSpPr txBox="1"/>
-          <p:nvPr/>
-        </p:nvSpPr>
-        <p:spPr>
-          <a:xfrm>
-            <a:off x="0" y="6550223"/>
-            <a:ext cx="12192000" cy="307777"/>
-          </a:xfrm>
-          <a:prstGeom prst="rect">
-            <a:avLst/>
-          </a:prstGeom>
-          <a:noFill/>
-        </p:spPr>
-        <p:txBody>
-          <a:bodyPr wrap="square" rtlCol="0">
-            <a:spAutoFit/>
-          </a:bodyPr>
-          <a:lstStyle/>
-          <a:p>
-            <a:r>
-              <a:rPr lang="en-US" sz="1400" dirty="0">
-                <a:solidFill>
-                  <a:schemeClr val="tx1">
-                    <a:lumMod val="65000"/>
-                    <a:lumOff val="35000"/>
-                  </a:schemeClr>
-                </a:solidFill>
-                <a:latin typeface="+mj-lt"/>
-                <a:ea typeface="Verdana" panose="020B0604030504040204" pitchFamily="34" charset="0"/>
-              </a:rPr>
-              <a:t>Source: Glassner, A. (2021). </a:t>
-            </a:r>
-            <a:r>
-              <a:rPr lang="en-US" sz="1400" i="1" dirty="0">
-                <a:solidFill>
-                  <a:schemeClr val="tx1">
-                    <a:lumMod val="65000"/>
-                    <a:lumOff val="35000"/>
-                  </a:schemeClr>
-                </a:solidFill>
-                <a:latin typeface="+mj-lt"/>
-                <a:ea typeface="Verdana" panose="020B0604030504040204" pitchFamily="34" charset="0"/>
-              </a:rPr>
-              <a:t>Deep learning: A visual approach</a:t>
-            </a:r>
-            <a:r>
-              <a:rPr lang="en-US" sz="1400" dirty="0">
-                <a:solidFill>
-                  <a:schemeClr val="tx1">
-                    <a:lumMod val="65000"/>
-                    <a:lumOff val="35000"/>
-                  </a:schemeClr>
-                </a:solidFill>
-                <a:latin typeface="+mj-lt"/>
-                <a:ea typeface="Verdana" panose="020B0604030504040204" pitchFamily="34" charset="0"/>
-              </a:rPr>
-              <a:t>. </a:t>
-            </a:r>
-            <a:r>
-              <a:rPr lang="en-US" sz="1400" b="0" i="0" dirty="0">
-                <a:solidFill>
-                  <a:schemeClr val="tx1">
-                    <a:lumMod val="65000"/>
-                    <a:lumOff val="35000"/>
-                  </a:schemeClr>
-                </a:solidFill>
-                <a:effectLst/>
-                <a:latin typeface="+mj-lt"/>
-                <a:ea typeface="Verdana" panose="020B0604030504040204" pitchFamily="34" charset="0"/>
-              </a:rPr>
-              <a:t>San Francisco, CA: No Starch Press. (Chapter </a:t>
-            </a:r>
-            <a:r>
-              <a:rPr lang="en-US" sz="1400" dirty="0">
-                <a:solidFill>
-                  <a:schemeClr val="tx1">
-                    <a:lumMod val="65000"/>
-                    <a:lumOff val="35000"/>
-                  </a:schemeClr>
-                </a:solidFill>
-                <a:latin typeface="+mj-lt"/>
-                <a:ea typeface="Verdana" panose="020B0604030504040204" pitchFamily="34" charset="0"/>
-              </a:rPr>
-              <a:t>20</a:t>
-            </a:r>
-            <a:r>
-              <a:rPr lang="en-US" sz="1400" b="0" i="0" dirty="0">
-                <a:solidFill>
-                  <a:schemeClr val="tx1">
-                    <a:lumMod val="65000"/>
-                    <a:lumOff val="35000"/>
-                  </a:schemeClr>
-                </a:solidFill>
-                <a:effectLst/>
-                <a:latin typeface="+mj-lt"/>
-                <a:ea typeface="Verdana" panose="020B0604030504040204" pitchFamily="34" charset="0"/>
-              </a:rPr>
-              <a:t>)</a:t>
-            </a:r>
-            <a:endParaRPr lang="en-US" sz="1400" dirty="0">
-              <a:solidFill>
-                <a:schemeClr val="tx1">
-                  <a:lumMod val="65000"/>
-                  <a:lumOff val="35000"/>
-                </a:schemeClr>
-              </a:solidFill>
-              <a:latin typeface="+mj-lt"/>
-              <a:ea typeface="Verdana" panose="020B0604030504040204" pitchFamily="34" charset="0"/>
-            </a:endParaRPr>
-          </a:p>
-        </p:txBody>
-      </p:sp>
       <p:pic>
         <p:nvPicPr>
-          <p:cNvPr id="6" name="Picture 5">
-            <a:extLst>
-              <a:ext uri="{FF2B5EF4-FFF2-40B4-BE49-F238E27FC236}">
-                <a16:creationId xmlns:a16="http://schemas.microsoft.com/office/drawing/2014/main" id="{6D6EB62B-2AF5-414F-AE49-8A9F33BF1690}"/>
+          <p:cNvPr id="3" name="Picture 2">
+            <a:extLst>
+              <a:ext uri="{FF2B5EF4-FFF2-40B4-BE49-F238E27FC236}">
+                <a16:creationId xmlns:a16="http://schemas.microsoft.com/office/drawing/2014/main" id="{88CC7D4C-7D31-4E3C-92F7-200A7C7F587F}"/>
               </a:ext>
             </a:extLst>
           </p:cNvPr>
@@ -8509,49 +8646,61 @@
         </p:blipFill>
         <p:spPr>
           <a:xfrm>
-            <a:off x="2694334" y="3645875"/>
-            <a:ext cx="2635250" cy="635000"/>
+            <a:off x="0" y="365760"/>
+            <a:ext cx="3233668" cy="805144"/>
           </a:xfrm>
           <a:prstGeom prst="rect">
             <a:avLst/>
           </a:prstGeom>
-          <a:effectLst>
-            <a:outerShdw blurRad="50800" dist="38100" dir="2700000" algn="tl" rotWithShape="0">
-              <a:prstClr val="black">
-                <a:alpha val="40000"/>
-              </a:prstClr>
-            </a:outerShdw>
-          </a:effectLst>
         </p:spPr>
       </p:pic>
       <p:sp>
         <p:nvSpPr>
-          <p:cNvPr id="20" name="Title 1">
-            <a:extLst>
-              <a:ext uri="{FF2B5EF4-FFF2-40B4-BE49-F238E27FC236}">
-                <a16:creationId xmlns:a16="http://schemas.microsoft.com/office/drawing/2014/main" id="{A768B6E7-76B8-4DF1-9B5C-732BFB29136A}"/>
-              </a:ext>
-            </a:extLst>
-          </p:cNvPr>
-          <p:cNvSpPr>
-            <a:spLocks noGrp="1"/>
-          </p:cNvSpPr>
-          <p:nvPr>
-            <p:ph type="title"/>
-          </p:nvPr>
+          <p:cNvPr id="4" name="Title 1">
+            <a:extLst>
+              <a:ext uri="{FF2B5EF4-FFF2-40B4-BE49-F238E27FC236}">
+                <a16:creationId xmlns:a16="http://schemas.microsoft.com/office/drawing/2014/main" id="{474EB2BC-3221-47A1-8ADF-BF3126732B5F}"/>
+              </a:ext>
+            </a:extLst>
+          </p:cNvPr>
+          <p:cNvSpPr txBox="1">
+            <a:spLocks/>
+          </p:cNvSpPr>
+          <p:nvPr/>
         </p:nvSpPr>
         <p:spPr>
           <a:xfrm>
-            <a:off x="0" y="793808"/>
-            <a:ext cx="12192000" cy="606943"/>
+            <a:off x="0" y="2705764"/>
+            <a:ext cx="12192000" cy="1446472"/>
           </a:xfrm>
+          <a:prstGeom prst="rect">
+            <a:avLst/>
+          </a:prstGeom>
           <a:noFill/>
         </p:spPr>
         <p:txBody>
-          <a:bodyPr>
+          <a:bodyPr vert="horz" lIns="91440" tIns="45720" rIns="91440" bIns="45720" rtlCol="0" anchor="ctr">
             <a:noAutofit/>
           </a:bodyPr>
-          <a:lstStyle/>
+          <a:lstStyle>
+            <a:lvl1pPr algn="l" defTabSz="914400" rtl="0" eaLnBrk="1" latinLnBrk="0" hangingPunct="1">
+              <a:lnSpc>
+                <a:spcPct val="90000"/>
+              </a:lnSpc>
+              <a:spcBef>
+                <a:spcPct val="0"/>
+              </a:spcBef>
+              <a:buNone/>
+              <a:defRPr sz="4400" kern="1200">
+                <a:solidFill>
+                  <a:schemeClr val="tx1"/>
+                </a:solidFill>
+                <a:latin typeface="+mj-lt"/>
+                <a:ea typeface="+mj-ea"/>
+                <a:cs typeface="+mj-cs"/>
+              </a:defRPr>
+            </a:lvl1pPr>
+          </a:lstStyle>
           <a:p>
             <a:pPr algn="ctr"/>
             <a:r>
@@ -8564,7 +8713,30 @@
                 </a:solidFill>
                 <a:latin typeface="Palatino Linotype" panose="02040502050505030304" pitchFamily="18" charset="0"/>
               </a:rPr>
-              <a:t>Transformer Building Blocks</a:t>
+              <a:t>Transformers Introduction</a:t>
+            </a:r>
+            <a:br>
+              <a:rPr lang="en-US" sz="3600" dirty="0">
+                <a:solidFill>
+                  <a:schemeClr val="tx1">
+                    <a:lumMod val="65000"/>
+                    <a:lumOff val="35000"/>
+                  </a:schemeClr>
+                </a:solidFill>
+                <a:latin typeface="Palatino Linotype" panose="02040502050505030304" pitchFamily="18" charset="0"/>
+              </a:rPr>
+            </a:br>
+            <a:r>
+              <a:rPr lang="en-US" sz="3600" dirty="0">
+                <a:solidFill>
+                  <a:schemeClr val="tx1">
+                    <a:lumMod val="65000"/>
+                    <a:lumOff val="35000"/>
+                  </a:schemeClr>
+                </a:solidFill>
+                <a:latin typeface="Palatino Linotype" panose="02040502050505030304" pitchFamily="18" charset="0"/>
+              </a:rPr>
+              <a:t>01.2_transformer_intro.ipynb</a:t>
             </a:r>
             <a:endParaRPr lang="en-US" sz="3600" dirty="0">
               <a:solidFill>
@@ -8579,158 +8751,10 @@
           </a:p>
         </p:txBody>
       </p:sp>
-      <p:pic>
-        <p:nvPicPr>
-          <p:cNvPr id="4" name="Picture 3">
-            <a:extLst>
-              <a:ext uri="{FF2B5EF4-FFF2-40B4-BE49-F238E27FC236}">
-                <a16:creationId xmlns:a16="http://schemas.microsoft.com/office/drawing/2014/main" id="{A4ABC55C-676F-4AE7-9EF2-40151F173FE9}"/>
-              </a:ext>
-            </a:extLst>
-          </p:cNvPr>
-          <p:cNvPicPr>
-            <a:picLocks noChangeAspect="1"/>
-          </p:cNvPicPr>
-          <p:nvPr/>
-        </p:nvPicPr>
-        <p:blipFill>
-          <a:blip r:embed="rId4"/>
-          <a:stretch>
-            <a:fillRect/>
-          </a:stretch>
-        </p:blipFill>
-        <p:spPr>
-          <a:xfrm>
-            <a:off x="3934266" y="3067016"/>
-            <a:ext cx="2260600" cy="635000"/>
-          </a:xfrm>
-          <a:prstGeom prst="rect">
-            <a:avLst/>
-          </a:prstGeom>
-          <a:effectLst>
-            <a:outerShdw blurRad="50800" dist="38100" dir="2700000" algn="tl" rotWithShape="0">
-              <a:prstClr val="black">
-                <a:alpha val="40000"/>
-              </a:prstClr>
-            </a:outerShdw>
-          </a:effectLst>
-        </p:spPr>
-      </p:pic>
-      <p:pic>
-        <p:nvPicPr>
-          <p:cNvPr id="7" name="Picture 6">
-            <a:extLst>
-              <a:ext uri="{FF2B5EF4-FFF2-40B4-BE49-F238E27FC236}">
-                <a16:creationId xmlns:a16="http://schemas.microsoft.com/office/drawing/2014/main" id="{9E7D3A10-885E-4555-A8EB-85F51F078300}"/>
-              </a:ext>
-            </a:extLst>
-          </p:cNvPr>
-          <p:cNvPicPr>
-            <a:picLocks noChangeAspect="1"/>
-          </p:cNvPicPr>
-          <p:nvPr/>
-        </p:nvPicPr>
-        <p:blipFill>
-          <a:blip r:embed="rId5"/>
-          <a:stretch>
-            <a:fillRect/>
-          </a:stretch>
-        </p:blipFill>
-        <p:spPr>
-          <a:xfrm>
-            <a:off x="6184787" y="3066415"/>
-            <a:ext cx="2755900" cy="635000"/>
-          </a:xfrm>
-          <a:prstGeom prst="rect">
-            <a:avLst/>
-          </a:prstGeom>
-          <a:effectLst>
-            <a:outerShdw blurRad="50800" dist="38100" dir="2700000" algn="tl" rotWithShape="0">
-              <a:prstClr val="black">
-                <a:alpha val="40000"/>
-              </a:prstClr>
-            </a:outerShdw>
-          </a:effectLst>
-        </p:spPr>
-      </p:pic>
-      <p:pic>
-        <p:nvPicPr>
-          <p:cNvPr id="11" name="Picture 10">
-            <a:extLst>
-              <a:ext uri="{FF2B5EF4-FFF2-40B4-BE49-F238E27FC236}">
-                <a16:creationId xmlns:a16="http://schemas.microsoft.com/office/drawing/2014/main" id="{7F15C6DC-63DA-408A-978F-237989161F42}"/>
-              </a:ext>
-            </a:extLst>
-          </p:cNvPr>
-          <p:cNvPicPr>
-            <a:picLocks noChangeAspect="1"/>
-          </p:cNvPicPr>
-          <p:nvPr/>
-        </p:nvPicPr>
-        <p:blipFill>
-          <a:blip r:embed="rId6"/>
-          <a:stretch>
-            <a:fillRect/>
-          </a:stretch>
-        </p:blipFill>
-        <p:spPr>
-          <a:xfrm>
-            <a:off x="7135894" y="3644924"/>
-            <a:ext cx="2451100" cy="635000"/>
-          </a:xfrm>
-          <a:prstGeom prst="rect">
-            <a:avLst/>
-          </a:prstGeom>
-          <a:effectLst>
-            <a:outerShdw blurRad="50800" dist="38100" dir="2700000" algn="tl" rotWithShape="0">
-              <a:prstClr val="black">
-                <a:alpha val="40000"/>
-              </a:prstClr>
-            </a:outerShdw>
-          </a:effectLst>
-        </p:spPr>
-      </p:pic>
-      <p:pic>
-        <p:nvPicPr>
-          <p:cNvPr id="15" name="Picture 14">
-            <a:extLst>
-              <a:ext uri="{FF2B5EF4-FFF2-40B4-BE49-F238E27FC236}">
-                <a16:creationId xmlns:a16="http://schemas.microsoft.com/office/drawing/2014/main" id="{DC963BF3-EA52-4DF2-B0BF-8AC021FFE85A}"/>
-              </a:ext>
-            </a:extLst>
-          </p:cNvPr>
-          <p:cNvPicPr>
-            <a:picLocks noChangeAspect="1"/>
-          </p:cNvPicPr>
-          <p:nvPr/>
-        </p:nvPicPr>
-        <p:blipFill>
-          <a:blip r:embed="rId7"/>
-          <a:stretch>
-            <a:fillRect/>
-          </a:stretch>
-        </p:blipFill>
-        <p:spPr>
-          <a:xfrm>
-            <a:off x="5385341" y="3644924"/>
-            <a:ext cx="1790700" cy="635000"/>
-          </a:xfrm>
-          <a:prstGeom prst="rect">
-            <a:avLst/>
-          </a:prstGeom>
-          <a:effectLst>
-            <a:outerShdw blurRad="50800" dist="38100" dir="2700000" algn="tl" rotWithShape="0">
-              <a:prstClr val="black">
-                <a:alpha val="40000"/>
-              </a:prstClr>
-            </a:outerShdw>
-          </a:effectLst>
-        </p:spPr>
-      </p:pic>
     </p:spTree>
     <p:extLst>
       <p:ext uri="{BB962C8B-B14F-4D97-AF65-F5344CB8AC3E}">
-        <p14:creationId xmlns:p14="http://schemas.microsoft.com/office/powerpoint/2010/main" val="3602552699"/>
+        <p14:creationId xmlns:p14="http://schemas.microsoft.com/office/powerpoint/2010/main" val="2261991877"/>
       </p:ext>
     </p:extLst>
   </p:cSld>
@@ -8769,59 +8793,12 @@
           <a:chExt cx="0" cy="0"/>
         </a:xfrm>
       </p:grpSpPr>
-      <p:pic>
-        <p:nvPicPr>
-          <p:cNvPr id="4098" name="Picture 2" descr="F20018">
-            <a:extLst>
-              <a:ext uri="{FF2B5EF4-FFF2-40B4-BE49-F238E27FC236}">
-                <a16:creationId xmlns:a16="http://schemas.microsoft.com/office/drawing/2014/main" id="{9D5C494A-0CBE-4B64-9D77-71FFFC718D89}"/>
-              </a:ext>
-            </a:extLst>
-          </p:cNvPr>
-          <p:cNvPicPr>
-            <a:picLocks noChangeAspect="1" noChangeArrowheads="1"/>
-          </p:cNvPicPr>
-          <p:nvPr/>
-        </p:nvPicPr>
-        <p:blipFill>
-          <a:blip r:embed="rId3">
-            <a:extLst>
-              <a:ext uri="{28A0092B-C50C-407E-A947-70E740481C1C}">
-                <a14:useLocalDpi xmlns:a14="http://schemas.microsoft.com/office/drawing/2010/main" val="0"/>
-              </a:ext>
-            </a:extLst>
-          </a:blip>
-          <a:srcRect/>
-          <a:stretch>
-            <a:fillRect/>
-          </a:stretch>
-        </p:blipFill>
-        <p:spPr bwMode="auto">
-          <a:xfrm>
-            <a:off x="2651828" y="2877302"/>
-            <a:ext cx="6888344" cy="1103396"/>
-          </a:xfrm>
-          <a:prstGeom prst="rect">
-            <a:avLst/>
-          </a:prstGeom>
-          <a:noFill/>
-          <a:extLst>
-            <a:ext uri="{909E8E84-426E-40DD-AFC4-6F175D3DCCD1}">
-              <a14:hiddenFill xmlns:a14="http://schemas.microsoft.com/office/drawing/2010/main">
-                <a:solidFill>
-                  <a:srgbClr val="FFFFFF"/>
-                </a:solidFill>
-              </a14:hiddenFill>
-            </a:ext>
-          </a:extLst>
-        </p:spPr>
-      </p:pic>
       <p:sp>
         <p:nvSpPr>
           <p:cNvPr id="3" name="TextBox 2">
             <a:extLst>
               <a:ext uri="{FF2B5EF4-FFF2-40B4-BE49-F238E27FC236}">
-                <a16:creationId xmlns:a16="http://schemas.microsoft.com/office/drawing/2014/main" id="{8B50B82C-A1EF-42B8-9CB8-B057F2C81533}"/>
+                <a16:creationId xmlns:a16="http://schemas.microsoft.com/office/drawing/2014/main" id="{C1E53685-A9F7-4FE0-ABDB-9B755F275882}"/>
               </a:ext>
             </a:extLst>
           </p:cNvPr>
@@ -8939,10 +8916,102 @@
       </p:sp>
       <p:pic>
         <p:nvPicPr>
-          <p:cNvPr id="7" name="Picture 6">
-            <a:extLst>
-              <a:ext uri="{FF2B5EF4-FFF2-40B4-BE49-F238E27FC236}">
-                <a16:creationId xmlns:a16="http://schemas.microsoft.com/office/drawing/2014/main" id="{41EFA874-9B25-4772-88F0-BDE024D1DF70}"/>
+          <p:cNvPr id="6" name="Picture 5">
+            <a:extLst>
+              <a:ext uri="{FF2B5EF4-FFF2-40B4-BE49-F238E27FC236}">
+                <a16:creationId xmlns:a16="http://schemas.microsoft.com/office/drawing/2014/main" id="{6D6EB62B-2AF5-414F-AE49-8A9F33BF1690}"/>
+              </a:ext>
+            </a:extLst>
+          </p:cNvPr>
+          <p:cNvPicPr>
+            <a:picLocks noChangeAspect="1"/>
+          </p:cNvPicPr>
+          <p:nvPr/>
+        </p:nvPicPr>
+        <p:blipFill>
+          <a:blip r:embed="rId3"/>
+          <a:stretch>
+            <a:fillRect/>
+          </a:stretch>
+        </p:blipFill>
+        <p:spPr>
+          <a:xfrm>
+            <a:off x="2694334" y="3645875"/>
+            <a:ext cx="2635250" cy="635000"/>
+          </a:xfrm>
+          <a:prstGeom prst="rect">
+            <a:avLst/>
+          </a:prstGeom>
+          <a:effectLst>
+            <a:outerShdw blurRad="50800" dist="38100" dir="2700000" algn="tl" rotWithShape="0">
+              <a:prstClr val="black">
+                <a:alpha val="40000"/>
+              </a:prstClr>
+            </a:outerShdw>
+          </a:effectLst>
+        </p:spPr>
+      </p:pic>
+      <p:sp>
+        <p:nvSpPr>
+          <p:cNvPr id="20" name="Title 1">
+            <a:extLst>
+              <a:ext uri="{FF2B5EF4-FFF2-40B4-BE49-F238E27FC236}">
+                <a16:creationId xmlns:a16="http://schemas.microsoft.com/office/drawing/2014/main" id="{A768B6E7-76B8-4DF1-9B5C-732BFB29136A}"/>
+              </a:ext>
+            </a:extLst>
+          </p:cNvPr>
+          <p:cNvSpPr>
+            <a:spLocks noGrp="1"/>
+          </p:cNvSpPr>
+          <p:nvPr>
+            <p:ph type="title"/>
+          </p:nvPr>
+        </p:nvSpPr>
+        <p:spPr>
+          <a:xfrm>
+            <a:off x="0" y="793808"/>
+            <a:ext cx="12192000" cy="606943"/>
+          </a:xfrm>
+          <a:noFill/>
+        </p:spPr>
+        <p:txBody>
+          <a:bodyPr>
+            <a:noAutofit/>
+          </a:bodyPr>
+          <a:lstStyle/>
+          <a:p>
+            <a:pPr algn="ctr"/>
+            <a:r>
+              <a:rPr lang="en-US" sz="3600" dirty="0">
+                <a:solidFill>
+                  <a:schemeClr val="tx1">
+                    <a:lumMod val="65000"/>
+                    <a:lumOff val="35000"/>
+                  </a:schemeClr>
+                </a:solidFill>
+                <a:latin typeface="Palatino Linotype" panose="02040502050505030304" pitchFamily="18" charset="0"/>
+              </a:rPr>
+              <a:t>Transformer Building Blocks</a:t>
+            </a:r>
+            <a:endParaRPr lang="en-US" sz="3600" dirty="0">
+              <a:solidFill>
+                <a:schemeClr val="tx1">
+                  <a:lumMod val="65000"/>
+                  <a:lumOff val="35000"/>
+                </a:schemeClr>
+              </a:solidFill>
+              <a:latin typeface="Palatino Linotype" panose="02040502050505030304" pitchFamily="18" charset="0"/>
+              <a:cs typeface="Segoe UI Light" panose="020B0502040204020203" pitchFamily="34" charset="0"/>
+            </a:endParaRPr>
+          </a:p>
+        </p:txBody>
+      </p:sp>
+      <p:pic>
+        <p:nvPicPr>
+          <p:cNvPr id="4" name="Picture 3">
+            <a:extLst>
+              <a:ext uri="{FF2B5EF4-FFF2-40B4-BE49-F238E27FC236}">
+                <a16:creationId xmlns:a16="http://schemas.microsoft.com/office/drawing/2014/main" id="{A4ABC55C-676F-4AE7-9EF2-40151F173FE9}"/>
               </a:ext>
             </a:extLst>
           </p:cNvPr>
@@ -8959,8 +9028,119 @@
         </p:blipFill>
         <p:spPr>
           <a:xfrm>
-            <a:off x="-13855" y="18288"/>
+            <a:off x="3934266" y="3067016"/>
             <a:ext cx="2260600" cy="635000"/>
+          </a:xfrm>
+          <a:prstGeom prst="rect">
+            <a:avLst/>
+          </a:prstGeom>
+          <a:effectLst>
+            <a:outerShdw blurRad="50800" dist="38100" dir="2700000" algn="tl" rotWithShape="0">
+              <a:prstClr val="black">
+                <a:alpha val="40000"/>
+              </a:prstClr>
+            </a:outerShdw>
+          </a:effectLst>
+        </p:spPr>
+      </p:pic>
+      <p:pic>
+        <p:nvPicPr>
+          <p:cNvPr id="7" name="Picture 6">
+            <a:extLst>
+              <a:ext uri="{FF2B5EF4-FFF2-40B4-BE49-F238E27FC236}">
+                <a16:creationId xmlns:a16="http://schemas.microsoft.com/office/drawing/2014/main" id="{9E7D3A10-885E-4555-A8EB-85F51F078300}"/>
+              </a:ext>
+            </a:extLst>
+          </p:cNvPr>
+          <p:cNvPicPr>
+            <a:picLocks noChangeAspect="1"/>
+          </p:cNvPicPr>
+          <p:nvPr/>
+        </p:nvPicPr>
+        <p:blipFill>
+          <a:blip r:embed="rId5"/>
+          <a:stretch>
+            <a:fillRect/>
+          </a:stretch>
+        </p:blipFill>
+        <p:spPr>
+          <a:xfrm>
+            <a:off x="6184787" y="3066415"/>
+            <a:ext cx="2755900" cy="635000"/>
+          </a:xfrm>
+          <a:prstGeom prst="rect">
+            <a:avLst/>
+          </a:prstGeom>
+          <a:effectLst>
+            <a:outerShdw blurRad="50800" dist="38100" dir="2700000" algn="tl" rotWithShape="0">
+              <a:prstClr val="black">
+                <a:alpha val="40000"/>
+              </a:prstClr>
+            </a:outerShdw>
+          </a:effectLst>
+        </p:spPr>
+      </p:pic>
+      <p:pic>
+        <p:nvPicPr>
+          <p:cNvPr id="11" name="Picture 10">
+            <a:extLst>
+              <a:ext uri="{FF2B5EF4-FFF2-40B4-BE49-F238E27FC236}">
+                <a16:creationId xmlns:a16="http://schemas.microsoft.com/office/drawing/2014/main" id="{7F15C6DC-63DA-408A-978F-237989161F42}"/>
+              </a:ext>
+            </a:extLst>
+          </p:cNvPr>
+          <p:cNvPicPr>
+            <a:picLocks noChangeAspect="1"/>
+          </p:cNvPicPr>
+          <p:nvPr/>
+        </p:nvPicPr>
+        <p:blipFill>
+          <a:blip r:embed="rId6"/>
+          <a:stretch>
+            <a:fillRect/>
+          </a:stretch>
+        </p:blipFill>
+        <p:spPr>
+          <a:xfrm>
+            <a:off x="7135894" y="3644924"/>
+            <a:ext cx="2451100" cy="635000"/>
+          </a:xfrm>
+          <a:prstGeom prst="rect">
+            <a:avLst/>
+          </a:prstGeom>
+          <a:effectLst>
+            <a:outerShdw blurRad="50800" dist="38100" dir="2700000" algn="tl" rotWithShape="0">
+              <a:prstClr val="black">
+                <a:alpha val="40000"/>
+              </a:prstClr>
+            </a:outerShdw>
+          </a:effectLst>
+        </p:spPr>
+      </p:pic>
+      <p:pic>
+        <p:nvPicPr>
+          <p:cNvPr id="15" name="Picture 14">
+            <a:extLst>
+              <a:ext uri="{FF2B5EF4-FFF2-40B4-BE49-F238E27FC236}">
+                <a16:creationId xmlns:a16="http://schemas.microsoft.com/office/drawing/2014/main" id="{DC963BF3-EA52-4DF2-B0BF-8AC021FFE85A}"/>
+              </a:ext>
+            </a:extLst>
+          </p:cNvPr>
+          <p:cNvPicPr>
+            <a:picLocks noChangeAspect="1"/>
+          </p:cNvPicPr>
+          <p:nvPr/>
+        </p:nvPicPr>
+        <p:blipFill>
+          <a:blip r:embed="rId7"/>
+          <a:stretch>
+            <a:fillRect/>
+          </a:stretch>
+        </p:blipFill>
+        <p:spPr>
+          <a:xfrm>
+            <a:off x="5385341" y="3644924"/>
+            <a:ext cx="1790700" cy="635000"/>
           </a:xfrm>
           <a:prstGeom prst="rect">
             <a:avLst/>
@@ -8977,7 +9157,7 @@
     </p:spTree>
     <p:extLst>
       <p:ext uri="{BB962C8B-B14F-4D97-AF65-F5344CB8AC3E}">
-        <p14:creationId xmlns:p14="http://schemas.microsoft.com/office/powerpoint/2010/main" val="1565508497"/>
+        <p14:creationId xmlns:p14="http://schemas.microsoft.com/office/powerpoint/2010/main" val="3602552699"/>
       </p:ext>
     </p:extLst>
   </p:cSld>

</xml_diff>

<commit_message>
Updates for the 11.03.22 workshop.
</commit_message>
<xml_diff>
--- a/presentations/01_transformers_intro.pptx
+++ b/presentations/01_transformers_intro.pptx
@@ -230,7 +230,7 @@
           <a:p>
             <a:fld id="{FD93C9B2-20F6-4DB1-B471-224337D0AC79}" type="datetimeFigureOut">
               <a:rPr lang="en-US" smtClean="0"/>
-              <a:t>9/6/2022</a:t>
+              <a:t>9/9/2022</a:t>
             </a:fld>
             <a:endParaRPr lang="en-US"/>
           </a:p>
@@ -3770,7 +3770,7 @@
           <a:p>
             <a:fld id="{C3F78080-8D0A-4BE8-A5B4-CB115102D524}" type="datetimeFigureOut">
               <a:rPr lang="en-US" smtClean="0"/>
-              <a:t>9/6/2022</a:t>
+              <a:t>9/9/2022</a:t>
             </a:fld>
             <a:endParaRPr lang="en-US"/>
           </a:p>
@@ -3968,7 +3968,7 @@
           <a:p>
             <a:fld id="{C3F78080-8D0A-4BE8-A5B4-CB115102D524}" type="datetimeFigureOut">
               <a:rPr lang="en-US" smtClean="0"/>
-              <a:t>9/6/2022</a:t>
+              <a:t>9/9/2022</a:t>
             </a:fld>
             <a:endParaRPr lang="en-US"/>
           </a:p>
@@ -4176,7 +4176,7 @@
           <a:p>
             <a:fld id="{C3F78080-8D0A-4BE8-A5B4-CB115102D524}" type="datetimeFigureOut">
               <a:rPr lang="en-US" smtClean="0"/>
-              <a:t>9/6/2022</a:t>
+              <a:t>9/9/2022</a:t>
             </a:fld>
             <a:endParaRPr lang="en-US"/>
           </a:p>
@@ -4374,7 +4374,7 @@
           <a:p>
             <a:fld id="{C3F78080-8D0A-4BE8-A5B4-CB115102D524}" type="datetimeFigureOut">
               <a:rPr lang="en-US" smtClean="0"/>
-              <a:t>9/6/2022</a:t>
+              <a:t>9/9/2022</a:t>
             </a:fld>
             <a:endParaRPr lang="en-US"/>
           </a:p>
@@ -4649,7 +4649,7 @@
           <a:p>
             <a:fld id="{C3F78080-8D0A-4BE8-A5B4-CB115102D524}" type="datetimeFigureOut">
               <a:rPr lang="en-US" smtClean="0"/>
-              <a:t>9/6/2022</a:t>
+              <a:t>9/9/2022</a:t>
             </a:fld>
             <a:endParaRPr lang="en-US"/>
           </a:p>
@@ -4914,7 +4914,7 @@
           <a:p>
             <a:fld id="{C3F78080-8D0A-4BE8-A5B4-CB115102D524}" type="datetimeFigureOut">
               <a:rPr lang="en-US" smtClean="0"/>
-              <a:t>9/6/2022</a:t>
+              <a:t>9/9/2022</a:t>
             </a:fld>
             <a:endParaRPr lang="en-US"/>
           </a:p>
@@ -5326,7 +5326,7 @@
           <a:p>
             <a:fld id="{C3F78080-8D0A-4BE8-A5B4-CB115102D524}" type="datetimeFigureOut">
               <a:rPr lang="en-US" smtClean="0"/>
-              <a:t>9/6/2022</a:t>
+              <a:t>9/9/2022</a:t>
             </a:fld>
             <a:endParaRPr lang="en-US"/>
           </a:p>
@@ -5467,7 +5467,7 @@
           <a:p>
             <a:fld id="{C3F78080-8D0A-4BE8-A5B4-CB115102D524}" type="datetimeFigureOut">
               <a:rPr lang="en-US" smtClean="0"/>
-              <a:t>9/6/2022</a:t>
+              <a:t>9/9/2022</a:t>
             </a:fld>
             <a:endParaRPr lang="en-US"/>
           </a:p>
@@ -5580,7 +5580,7 @@
           <a:p>
             <a:fld id="{C3F78080-8D0A-4BE8-A5B4-CB115102D524}" type="datetimeFigureOut">
               <a:rPr lang="en-US" smtClean="0"/>
-              <a:t>9/6/2022</a:t>
+              <a:t>9/9/2022</a:t>
             </a:fld>
             <a:endParaRPr lang="en-US"/>
           </a:p>
@@ -5891,7 +5891,7 @@
           <a:p>
             <a:fld id="{C3F78080-8D0A-4BE8-A5B4-CB115102D524}" type="datetimeFigureOut">
               <a:rPr lang="en-US" smtClean="0"/>
-              <a:t>9/6/2022</a:t>
+              <a:t>9/9/2022</a:t>
             </a:fld>
             <a:endParaRPr lang="en-US"/>
           </a:p>
@@ -6179,7 +6179,7 @@
           <a:p>
             <a:fld id="{C3F78080-8D0A-4BE8-A5B4-CB115102D524}" type="datetimeFigureOut">
               <a:rPr lang="en-US" smtClean="0"/>
-              <a:t>9/6/2022</a:t>
+              <a:t>9/9/2022</a:t>
             </a:fld>
             <a:endParaRPr lang="en-US"/>
           </a:p>
@@ -6420,7 +6420,7 @@
           <a:p>
             <a:fld id="{C3F78080-8D0A-4BE8-A5B4-CB115102D524}" type="datetimeFigureOut">
               <a:rPr lang="en-US" smtClean="0"/>
-              <a:t>9/6/2022</a:t>
+              <a:t>9/9/2022</a:t>
             </a:fld>
             <a:endParaRPr lang="en-US"/>
           </a:p>
@@ -11609,10 +11609,10 @@
       </p:sp>
       <p:pic>
         <p:nvPicPr>
-          <p:cNvPr id="4" name="Picture 3">
-            <a:extLst>
-              <a:ext uri="{FF2B5EF4-FFF2-40B4-BE49-F238E27FC236}">
-                <a16:creationId xmlns:a16="http://schemas.microsoft.com/office/drawing/2014/main" id="{E845CA45-9FCE-AD57-D13C-F477FC5109BF}"/>
+          <p:cNvPr id="3" name="Picture 2" descr="A picture containing graphical user interface&#10;&#10;Description automatically generated">
+            <a:extLst>
+              <a:ext uri="{FF2B5EF4-FFF2-40B4-BE49-F238E27FC236}">
+                <a16:creationId xmlns:a16="http://schemas.microsoft.com/office/drawing/2014/main" id="{E62A5D0F-C555-F80D-BAD7-7216631DE2B1}"/>
               </a:ext>
             </a:extLst>
           </p:cNvPr>
@@ -11629,13 +11629,14 @@
               </a:ext>
             </a:extLst>
           </a:blip>
-          <a:srcRect l="671" r="671"/>
-          <a:stretch/>
+          <a:stretch>
+            <a:fillRect/>
+          </a:stretch>
         </p:blipFill>
         <p:spPr>
           <a:xfrm>
-            <a:off x="2264780" y="1369884"/>
-            <a:ext cx="7662440" cy="3850264"/>
+            <a:off x="1695450" y="1719262"/>
+            <a:ext cx="8801100" cy="3419475"/>
           </a:xfrm>
           <a:prstGeom prst="rect">
             <a:avLst/>

</xml_diff>

<commit_message>
Added missing images + content & code fixes.
</commit_message>
<xml_diff>
--- a/presentations/01_transformers_intro.pptx
+++ b/presentations/01_transformers_intro.pptx
@@ -230,7 +230,7 @@
           <a:p>
             <a:fld id="{FD93C9B2-20F6-4DB1-B471-224337D0AC79}" type="datetimeFigureOut">
               <a:rPr lang="en-US" smtClean="0"/>
-              <a:t>10/27/2022</a:t>
+              <a:t>11/3/2022</a:t>
             </a:fld>
             <a:endParaRPr lang="en-US"/>
           </a:p>
@@ -795,7 +795,7 @@
                 <a:effectLst/>
                 <a:latin typeface="+mn-lt"/>
               </a:rPr>
-              <a:t>In summary, all the Encoders are identical to each other, and all the Decoders are identical to each other.  A quick recap and review:</a:t>
+              <a:t>In summary, all the Encoders are identical to each other, and all the Decoders are identical to each other.  A quick review:</a:t>
             </a:r>
           </a:p>
           <a:p>
@@ -971,50 +971,7 @@
             </a:pPr>
             <a:r>
               <a:rPr lang="en-US" dirty="0"/>
-              <a:t>Pictured here is the family tree of the most prominent transformer models.  With more than 50 models available, this is not a complete list.  Please see the transformer_family_tree.pdf for additional information about the models shown here.  </a:t>
-            </a:r>
-          </a:p>
-          <a:p>
-            <a:pPr marL="0" marR="0" lvl="0" indent="0" algn="l" defTabSz="914400" rtl="0" eaLnBrk="1" fontAlgn="auto" latinLnBrk="0" hangingPunct="1">
-              <a:lnSpc>
-                <a:spcPct val="100000"/>
-              </a:lnSpc>
-              <a:spcBef>
-                <a:spcPts val="0"/>
-              </a:spcBef>
-              <a:spcAft>
-                <a:spcPts val="0"/>
-              </a:spcAft>
-              <a:buClrTx/>
-              <a:buSzTx/>
-              <a:buFontTx/>
-              <a:buNone/>
-              <a:tabLst/>
-              <a:defRPr/>
-            </a:pPr>
-            <a:endParaRPr lang="en-US" dirty="0"/>
-          </a:p>
-          <a:p>
-            <a:pPr marL="0" marR="0" lvl="0" indent="0" algn="l" defTabSz="914400" rtl="0" eaLnBrk="1" fontAlgn="auto" latinLnBrk="0" hangingPunct="1">
-              <a:lnSpc>
-                <a:spcPct val="100000"/>
-              </a:lnSpc>
-              <a:spcBef>
-                <a:spcPts val="0"/>
-              </a:spcBef>
-              <a:spcAft>
-                <a:spcPts val="0"/>
-              </a:spcAft>
-              <a:buClrTx/>
-              <a:buSzTx/>
-              <a:buFontTx/>
-              <a:buNone/>
-              <a:tabLst/>
-              <a:defRPr/>
-            </a:pPr>
-            <a:r>
-              <a:rPr lang="en-US" dirty="0"/>
-              <a:t>In our next session, we will examine the inner-workings of BERT.</a:t>
+              <a:t>And finally, pictured here is the family tree of the most prominent transformer models.  With more than 50 models available, this is not a complete list.  </a:t>
             </a:r>
           </a:p>
         </p:txBody>
@@ -1821,7 +1778,7 @@
                 <a:effectLst/>
                 <a:latin typeface="+mn-lt"/>
               </a:rPr>
-              <a:t>An encoder may feature multiple transformer building blocks.  The encoder pictured here, for example, contains both a self-attention and feed-forward layer.  After each, a layer norm operation is executed.  And two skip connections complete this design. </a:t>
+              <a:t>A transformer may feature multiple transformer building blocks, in a variety of configurations.  The encoder pictured here, for example, contains both a self-attention and feed-forward layer.  And after each, a layer norm operation is executed.  And two skip connections complete this design. </a:t>
             </a:r>
           </a:p>
           <a:p>
@@ -1945,12 +1902,51 @@
             </a:pPr>
             <a:r>
               <a:rPr lang="en-US" dirty="0"/>
-              <a:t>Because all the information about an input is represented in a single piece of state memory, or context vector, the networks inside each recurrent cell must compress everything that’s needed into the available space. And no matter how large we make the state memory, we can always get an input that exceeds available memory.   Inevitably, vital information is lost.  </a:t>
+              <a:t>State memory is limited in RNNs.  Two consequences – a) limits the size of model inputs, b) vital information loss caused by compression. </a:t>
             </a:r>
           </a:p>
           <a:p>
             <a:pPr marL="228600" indent="-228600" algn="l">
               <a:buAutoNum type="arabicPeriod"/>
+            </a:pPr>
+            <a:r>
+              <a:rPr lang="en-US" dirty="0"/>
+              <a:t>RNNs are trained one word at a time.  And this can be slow.  </a:t>
+            </a:r>
+          </a:p>
+          <a:p>
+            <a:pPr marL="228600" indent="-228600" algn="l">
+              <a:buAutoNum type="arabicPeriod"/>
+            </a:pPr>
+            <a:endParaRPr lang="en-US" dirty="0"/>
+          </a:p>
+          <a:p>
+            <a:pPr marL="0" indent="0" algn="l">
+              <a:buNone/>
+            </a:pPr>
+            <a:r>
+              <a:rPr lang="en-US" dirty="0"/>
+              <a:t>=====</a:t>
+            </a:r>
+          </a:p>
+          <a:p>
+            <a:pPr marL="0" indent="0" algn="l">
+              <a:buNone/>
+            </a:pPr>
+            <a:r>
+              <a:rPr lang="en-US" dirty="0"/>
+              <a:t>Because all the information about an input is represented in a single piece of state memory, or context vector, the networks inside each recurrent cell must compress everything that’s needed into the available space. And no matter how large we make the state memory, we can always get an input that exceeds available memory.   Inevitably, vital information is lost.  </a:t>
+            </a:r>
+          </a:p>
+          <a:p>
+            <a:pPr marL="0" indent="0" algn="l">
+              <a:buNone/>
+            </a:pPr>
+            <a:endParaRPr lang="en-US" dirty="0"/>
+          </a:p>
+          <a:p>
+            <a:pPr marL="0" indent="0" algn="l">
+              <a:buNone/>
             </a:pPr>
             <a:r>
               <a:rPr lang="en-US" dirty="0"/>
@@ -2389,7 +2385,7 @@
                 <a:ea typeface="Malgun Gothic" panose="020B0503020000020004" pitchFamily="34" charset="-127"/>
                 <a:cs typeface="Times New Roman" panose="02020603050405020304" pitchFamily="18" charset="0"/>
               </a:rPr>
-              <a:t>Hopefully, the paint analogy from today’s first mini-lecture has helped you gain an intuitive understanding of attention.  We will now consider transformers from a technical architecture point-of-view.  We start with a quick review of RNN architecture and its shortcomings.  </a:t>
+              <a:t>Let’s start with a quick review of RNN architecture and its shortcomings.  </a:t>
             </a:r>
           </a:p>
           <a:p>
@@ -2400,7 +2396,7 @@
             <a:pPr algn="l" fontAlgn="base"/>
             <a:r>
               <a:rPr lang="en-US" dirty="0"/>
-              <a:t>RNN models contain a feedback loop which allows information to move from one step to another.  As such, they’re ideal for modeling sequential data like text. As pictured here, an RNN receives some input (a word or character), feeds it through the network, and outputs a vector called the hidden state. At the same time, the model feeds some information back to itself via the feedback loop, which it can then use in the next step. </a:t>
+              <a:t>RNN models contain a feedback loop which allows information to move from one step to another.  As such, they’re ideal for modeling sequential data like text. As shown here, an RNN receives some input (a word or character), feeds it through the network, and outputs a vector called the hidden state. At the same time, the model feeds some information back to itself via the feedback loop, which it can then use in the next step. </a:t>
             </a:r>
           </a:p>
           <a:p>
@@ -3118,7 +3114,7 @@
                 <a:effectLst/>
                 <a:latin typeface="charter"/>
               </a:rPr>
-              <a:t>.”  The transformer was born.  And since then, it has proven to be a powerful and capable architecture, used in a variety of ways.</a:t>
+              <a:t>.”  The transformer was born.  And since then, it has proven to be a powerful and capable architecture, used in a variety of ways.  We’ll take an in-depth look at attention in next week’s workshop.</a:t>
             </a:r>
           </a:p>
           <a:p>
@@ -3267,7 +3263,7 @@
                 <a:effectLst/>
                 <a:latin typeface="+mn-lt"/>
               </a:rPr>
-              <a:t>We begin our transformer learning journey with a quick (high-level) overview of the architecture.  Like RNNs, transformer architecture excels at handling sequential data.  Translation is a special kind of sequential task which takes a text sequence in one language and outputs it in another. </a:t>
+              <a:t>Like RNNs, the transformer architecture excels at handling sequential data.  Translation is a special kind of sequential task which takes a text sequence in one language and outputs it in another. </a:t>
             </a:r>
           </a:p>
           <a:p>
@@ -3773,7 +3769,7 @@
           <a:p>
             <a:fld id="{C3F78080-8D0A-4BE8-A5B4-CB115102D524}" type="datetimeFigureOut">
               <a:rPr lang="en-US" smtClean="0"/>
-              <a:t>10/27/2022</a:t>
+              <a:t>11/3/2022</a:t>
             </a:fld>
             <a:endParaRPr lang="en-US"/>
           </a:p>
@@ -3971,7 +3967,7 @@
           <a:p>
             <a:fld id="{C3F78080-8D0A-4BE8-A5B4-CB115102D524}" type="datetimeFigureOut">
               <a:rPr lang="en-US" smtClean="0"/>
-              <a:t>10/27/2022</a:t>
+              <a:t>11/3/2022</a:t>
             </a:fld>
             <a:endParaRPr lang="en-US"/>
           </a:p>
@@ -4179,7 +4175,7 @@
           <a:p>
             <a:fld id="{C3F78080-8D0A-4BE8-A5B4-CB115102D524}" type="datetimeFigureOut">
               <a:rPr lang="en-US" smtClean="0"/>
-              <a:t>10/27/2022</a:t>
+              <a:t>11/3/2022</a:t>
             </a:fld>
             <a:endParaRPr lang="en-US"/>
           </a:p>
@@ -4377,7 +4373,7 @@
           <a:p>
             <a:fld id="{C3F78080-8D0A-4BE8-A5B4-CB115102D524}" type="datetimeFigureOut">
               <a:rPr lang="en-US" smtClean="0"/>
-              <a:t>10/27/2022</a:t>
+              <a:t>11/3/2022</a:t>
             </a:fld>
             <a:endParaRPr lang="en-US"/>
           </a:p>
@@ -4652,7 +4648,7 @@
           <a:p>
             <a:fld id="{C3F78080-8D0A-4BE8-A5B4-CB115102D524}" type="datetimeFigureOut">
               <a:rPr lang="en-US" smtClean="0"/>
-              <a:t>10/27/2022</a:t>
+              <a:t>11/3/2022</a:t>
             </a:fld>
             <a:endParaRPr lang="en-US"/>
           </a:p>
@@ -4917,7 +4913,7 @@
           <a:p>
             <a:fld id="{C3F78080-8D0A-4BE8-A5B4-CB115102D524}" type="datetimeFigureOut">
               <a:rPr lang="en-US" smtClean="0"/>
-              <a:t>10/27/2022</a:t>
+              <a:t>11/3/2022</a:t>
             </a:fld>
             <a:endParaRPr lang="en-US"/>
           </a:p>
@@ -5329,7 +5325,7 @@
           <a:p>
             <a:fld id="{C3F78080-8D0A-4BE8-A5B4-CB115102D524}" type="datetimeFigureOut">
               <a:rPr lang="en-US" smtClean="0"/>
-              <a:t>10/27/2022</a:t>
+              <a:t>11/3/2022</a:t>
             </a:fld>
             <a:endParaRPr lang="en-US"/>
           </a:p>
@@ -5470,7 +5466,7 @@
           <a:p>
             <a:fld id="{C3F78080-8D0A-4BE8-A5B4-CB115102D524}" type="datetimeFigureOut">
               <a:rPr lang="en-US" smtClean="0"/>
-              <a:t>10/27/2022</a:t>
+              <a:t>11/3/2022</a:t>
             </a:fld>
             <a:endParaRPr lang="en-US"/>
           </a:p>
@@ -5583,7 +5579,7 @@
           <a:p>
             <a:fld id="{C3F78080-8D0A-4BE8-A5B4-CB115102D524}" type="datetimeFigureOut">
               <a:rPr lang="en-US" smtClean="0"/>
-              <a:t>10/27/2022</a:t>
+              <a:t>11/3/2022</a:t>
             </a:fld>
             <a:endParaRPr lang="en-US"/>
           </a:p>
@@ -5894,7 +5890,7 @@
           <a:p>
             <a:fld id="{C3F78080-8D0A-4BE8-A5B4-CB115102D524}" type="datetimeFigureOut">
               <a:rPr lang="en-US" smtClean="0"/>
-              <a:t>10/27/2022</a:t>
+              <a:t>11/3/2022</a:t>
             </a:fld>
             <a:endParaRPr lang="en-US"/>
           </a:p>
@@ -6182,7 +6178,7 @@
           <a:p>
             <a:fld id="{C3F78080-8D0A-4BE8-A5B4-CB115102D524}" type="datetimeFigureOut">
               <a:rPr lang="en-US" smtClean="0"/>
-              <a:t>10/27/2022</a:t>
+              <a:t>11/3/2022</a:t>
             </a:fld>
             <a:endParaRPr lang="en-US"/>
           </a:p>
@@ -6423,7 +6419,7 @@
           <a:p>
             <a:fld id="{C3F78080-8D0A-4BE8-A5B4-CB115102D524}" type="datetimeFigureOut">
               <a:rPr lang="en-US" smtClean="0"/>
-              <a:t>10/27/2022</a:t>
+              <a:t>11/3/2022</a:t>
             </a:fld>
             <a:endParaRPr lang="en-US"/>
           </a:p>
@@ -9601,7 +9597,7 @@
                 </a:solidFill>
                 <a:latin typeface="Palatino Linotype" panose="02040502050505030304" pitchFamily="18" charset="0"/>
               </a:rPr>
-              <a:t>Learning Objective 1</a:t>
+              <a:t>Limits of Recurrent Neural Networks</a:t>
             </a:r>
           </a:p>
         </p:txBody>
@@ -9823,7 +9819,7 @@
                 </a:solidFill>
                 <a:latin typeface="Palatino Linotype" panose="02040502050505030304" pitchFamily="18" charset="0"/>
               </a:rPr>
-              <a:t>Learning Objective 1</a:t>
+              <a:t>Basic Transformer Architecture</a:t>
             </a:r>
           </a:p>
         </p:txBody>
@@ -10045,229 +10041,7 @@
                 </a:solidFill>
                 <a:latin typeface="Palatino Linotype" panose="02040502050505030304" pitchFamily="18" charset="0"/>
               </a:rPr>
-              <a:t>Learning Objective 1</a:t>
-            </a:r>
-          </a:p>
-        </p:txBody>
-      </p:sp>
-      <p:sp>
-        <p:nvSpPr>
-          <p:cNvPr id="7" name="Content Placeholder 2">
-            <a:extLst>
-              <a:ext uri="{FF2B5EF4-FFF2-40B4-BE49-F238E27FC236}">
-                <a16:creationId xmlns:a16="http://schemas.microsoft.com/office/drawing/2014/main" id="{6D3279E5-D518-B484-9FCF-B12663A4E8FF}"/>
-              </a:ext>
-            </a:extLst>
-          </p:cNvPr>
-          <p:cNvSpPr txBox="1">
-            <a:spLocks/>
-          </p:cNvSpPr>
-          <p:nvPr/>
-        </p:nvSpPr>
-        <p:spPr>
-          <a:xfrm>
-            <a:off x="1013564" y="3743082"/>
-            <a:ext cx="10515600" cy="504215"/>
-          </a:xfrm>
-          <a:prstGeom prst="rect">
-            <a:avLst/>
-          </a:prstGeom>
-        </p:spPr>
-        <p:txBody>
-          <a:bodyPr vert="horz" lIns="91440" tIns="45720" rIns="91440" bIns="45720" rtlCol="0">
-            <a:normAutofit/>
-          </a:bodyPr>
-          <a:lstStyle>
-            <a:lvl1pPr marL="228600" indent="-228600" algn="l" defTabSz="914400" rtl="0" eaLnBrk="1" latinLnBrk="0" hangingPunct="1">
-              <a:lnSpc>
-                <a:spcPct val="90000"/>
-              </a:lnSpc>
-              <a:spcBef>
-                <a:spcPts val="1000"/>
-              </a:spcBef>
-              <a:buFont typeface="Arial" panose="020B0604020202020204" pitchFamily="34" charset="0"/>
-              <a:buChar char="•"/>
-              <a:defRPr sz="2800" kern="1200">
-                <a:solidFill>
-                  <a:schemeClr val="tx1"/>
-                </a:solidFill>
-                <a:latin typeface="+mn-lt"/>
-                <a:ea typeface="+mn-ea"/>
-                <a:cs typeface="+mn-cs"/>
-              </a:defRPr>
-            </a:lvl1pPr>
-            <a:lvl2pPr marL="685800" indent="-228600" algn="l" defTabSz="914400" rtl="0" eaLnBrk="1" latinLnBrk="0" hangingPunct="1">
-              <a:lnSpc>
-                <a:spcPct val="90000"/>
-              </a:lnSpc>
-              <a:spcBef>
-                <a:spcPts val="500"/>
-              </a:spcBef>
-              <a:buFont typeface="Arial" panose="020B0604020202020204" pitchFamily="34" charset="0"/>
-              <a:buChar char="•"/>
-              <a:defRPr sz="2400" kern="1200">
-                <a:solidFill>
-                  <a:schemeClr val="tx1"/>
-                </a:solidFill>
-                <a:latin typeface="+mn-lt"/>
-                <a:ea typeface="+mn-ea"/>
-                <a:cs typeface="+mn-cs"/>
-              </a:defRPr>
-            </a:lvl2pPr>
-            <a:lvl3pPr marL="1143000" indent="-228600" algn="l" defTabSz="914400" rtl="0" eaLnBrk="1" latinLnBrk="0" hangingPunct="1">
-              <a:lnSpc>
-                <a:spcPct val="90000"/>
-              </a:lnSpc>
-              <a:spcBef>
-                <a:spcPts val="500"/>
-              </a:spcBef>
-              <a:buFont typeface="Arial" panose="020B0604020202020204" pitchFamily="34" charset="0"/>
-              <a:buChar char="•"/>
-              <a:defRPr sz="2000" kern="1200">
-                <a:solidFill>
-                  <a:schemeClr val="tx1"/>
-                </a:solidFill>
-                <a:latin typeface="+mn-lt"/>
-                <a:ea typeface="+mn-ea"/>
-                <a:cs typeface="+mn-cs"/>
-              </a:defRPr>
-            </a:lvl3pPr>
-            <a:lvl4pPr marL="1600200" indent="-228600" algn="l" defTabSz="914400" rtl="0" eaLnBrk="1" latinLnBrk="0" hangingPunct="1">
-              <a:lnSpc>
-                <a:spcPct val="90000"/>
-              </a:lnSpc>
-              <a:spcBef>
-                <a:spcPts val="500"/>
-              </a:spcBef>
-              <a:buFont typeface="Arial" panose="020B0604020202020204" pitchFamily="34" charset="0"/>
-              <a:buChar char="•"/>
-              <a:defRPr sz="1800" kern="1200">
-                <a:solidFill>
-                  <a:schemeClr val="tx1"/>
-                </a:solidFill>
-                <a:latin typeface="+mn-lt"/>
-                <a:ea typeface="+mn-ea"/>
-                <a:cs typeface="+mn-cs"/>
-              </a:defRPr>
-            </a:lvl4pPr>
-            <a:lvl5pPr marL="2057400" indent="-228600" algn="l" defTabSz="914400" rtl="0" eaLnBrk="1" latinLnBrk="0" hangingPunct="1">
-              <a:lnSpc>
-                <a:spcPct val="90000"/>
-              </a:lnSpc>
-              <a:spcBef>
-                <a:spcPts val="500"/>
-              </a:spcBef>
-              <a:buFont typeface="Arial" panose="020B0604020202020204" pitchFamily="34" charset="0"/>
-              <a:buChar char="•"/>
-              <a:defRPr sz="1800" kern="1200">
-                <a:solidFill>
-                  <a:schemeClr val="tx1"/>
-                </a:solidFill>
-                <a:latin typeface="+mn-lt"/>
-                <a:ea typeface="+mn-ea"/>
-                <a:cs typeface="+mn-cs"/>
-              </a:defRPr>
-            </a:lvl5pPr>
-            <a:lvl6pPr marL="2514600" indent="-228600" algn="l" defTabSz="914400" rtl="0" eaLnBrk="1" latinLnBrk="0" hangingPunct="1">
-              <a:lnSpc>
-                <a:spcPct val="90000"/>
-              </a:lnSpc>
-              <a:spcBef>
-                <a:spcPts val="500"/>
-              </a:spcBef>
-              <a:buFont typeface="Arial" panose="020B0604020202020204" pitchFamily="34" charset="0"/>
-              <a:buChar char="•"/>
-              <a:defRPr sz="1800" kern="1200">
-                <a:solidFill>
-                  <a:schemeClr val="tx1"/>
-                </a:solidFill>
-                <a:latin typeface="+mn-lt"/>
-                <a:ea typeface="+mn-ea"/>
-                <a:cs typeface="+mn-cs"/>
-              </a:defRPr>
-            </a:lvl6pPr>
-            <a:lvl7pPr marL="2971800" indent="-228600" algn="l" defTabSz="914400" rtl="0" eaLnBrk="1" latinLnBrk="0" hangingPunct="1">
-              <a:lnSpc>
-                <a:spcPct val="90000"/>
-              </a:lnSpc>
-              <a:spcBef>
-                <a:spcPts val="500"/>
-              </a:spcBef>
-              <a:buFont typeface="Arial" panose="020B0604020202020204" pitchFamily="34" charset="0"/>
-              <a:buChar char="•"/>
-              <a:defRPr sz="1800" kern="1200">
-                <a:solidFill>
-                  <a:schemeClr val="tx1"/>
-                </a:solidFill>
-                <a:latin typeface="+mn-lt"/>
-                <a:ea typeface="+mn-ea"/>
-                <a:cs typeface="+mn-cs"/>
-              </a:defRPr>
-            </a:lvl7pPr>
-            <a:lvl8pPr marL="3429000" indent="-228600" algn="l" defTabSz="914400" rtl="0" eaLnBrk="1" latinLnBrk="0" hangingPunct="1">
-              <a:lnSpc>
-                <a:spcPct val="90000"/>
-              </a:lnSpc>
-              <a:spcBef>
-                <a:spcPts val="500"/>
-              </a:spcBef>
-              <a:buFont typeface="Arial" panose="020B0604020202020204" pitchFamily="34" charset="0"/>
-              <a:buChar char="•"/>
-              <a:defRPr sz="1800" kern="1200">
-                <a:solidFill>
-                  <a:schemeClr val="tx1"/>
-                </a:solidFill>
-                <a:latin typeface="+mn-lt"/>
-                <a:ea typeface="+mn-ea"/>
-                <a:cs typeface="+mn-cs"/>
-              </a:defRPr>
-            </a:lvl8pPr>
-            <a:lvl9pPr marL="3886200" indent="-228600" algn="l" defTabSz="914400" rtl="0" eaLnBrk="1" latinLnBrk="0" hangingPunct="1">
-              <a:lnSpc>
-                <a:spcPct val="90000"/>
-              </a:lnSpc>
-              <a:spcBef>
-                <a:spcPts val="500"/>
-              </a:spcBef>
-              <a:buFont typeface="Arial" panose="020B0604020202020204" pitchFamily="34" charset="0"/>
-              <a:buChar char="•"/>
-              <a:defRPr sz="1800" kern="1200">
-                <a:solidFill>
-                  <a:schemeClr val="tx1"/>
-                </a:solidFill>
-                <a:latin typeface="+mn-lt"/>
-                <a:ea typeface="+mn-ea"/>
-                <a:cs typeface="+mn-cs"/>
-              </a:defRPr>
-            </a:lvl9pPr>
-          </a:lstStyle>
-          <a:p>
-            <a:pPr>
-              <a:buFont typeface="Wingdings" panose="05000000000000000000" pitchFamily="2" charset="2"/>
-              <a:buChar char="Ø"/>
-            </a:pPr>
-            <a:r>
-              <a:rPr lang="en-US" dirty="0">
-                <a:solidFill>
-                  <a:schemeClr val="tx1">
-                    <a:lumMod val="75000"/>
-                    <a:lumOff val="25000"/>
-                  </a:schemeClr>
-                </a:solidFill>
-              </a:rPr>
-              <a:t> </a:t>
-            </a:r>
-            <a:r>
-              <a:rPr lang="en-US" dirty="0">
-                <a:solidFill>
-                  <a:schemeClr val="tx1">
-                    <a:lumMod val="75000"/>
-                    <a:lumOff val="25000"/>
-                  </a:schemeClr>
-                </a:solidFill>
-                <a:latin typeface="Palatino Linotype" panose="02040502050505030304" pitchFamily="18" charset="0"/>
-              </a:rPr>
-              <a:t>Learning Objective 1</a:t>
+              <a:t>Transformer Building Blocks</a:t>
             </a:r>
           </a:p>
         </p:txBody>

</xml_diff>

<commit_message>
Updated transformers_intro.pptx to new color palette.
</commit_message>
<xml_diff>
--- a/presentations/01_transformers_intro.pptx
+++ b/presentations/01_transformers_intro.pptx
@@ -680,7 +680,7 @@
                 <a:effectLst/>
                 <a:latin typeface="charter"/>
               </a:rPr>
-              <a:t>All decoders have the same architecture.   And like the encoder, the decoder contains both </a:t>
+              <a:t>And at a high-level, decoders also have the same basic architecture.  Like the encoder, the decoder contains both </a:t>
             </a:r>
             <a:r>
               <a:rPr lang="en-US" b="1" i="0" dirty="0">
@@ -795,7 +795,7 @@
                 <a:effectLst/>
                 <a:latin typeface="+mn-lt"/>
               </a:rPr>
-              <a:t>In summary, all the Encoders are identical to each other, and all the Decoders are identical to each other.  A quick review:</a:t>
+              <a:t>Alright, let’s take one final look at our encoder / decoder side-by-side.  A quick review:</a:t>
             </a:r>
           </a:p>
           <a:p>
@@ -1902,7 +1902,25 @@
             </a:pPr>
             <a:r>
               <a:rPr lang="en-US" dirty="0"/>
-              <a:t>State memory is limited in RNNs.  Two consequences – a) limits the size of model inputs, b) vital information loss caused by compression. </a:t>
+              <a:t>State memory is limited in RNNs.  Two consequences:</a:t>
+            </a:r>
+          </a:p>
+          <a:p>
+            <a:pPr marL="685800" lvl="1" indent="-228600" algn="l">
+              <a:buAutoNum type="arabicPeriod"/>
+            </a:pPr>
+            <a:r>
+              <a:rPr lang="en-US" dirty="0"/>
+              <a:t>Limits the size of input data. </a:t>
+            </a:r>
+          </a:p>
+          <a:p>
+            <a:pPr marL="685800" lvl="1" indent="-228600" algn="l">
+              <a:buAutoNum type="arabicPeriod"/>
+            </a:pPr>
+            <a:r>
+              <a:rPr lang="en-US" dirty="0"/>
+              <a:t>Creates a bottleneck. </a:t>
             </a:r>
           </a:p>
           <a:p>
@@ -3540,7 +3558,7 @@
                 <a:effectLst/>
                 <a:latin typeface="charter"/>
               </a:rPr>
-              <a:t>All encoders have the same architecture.  Each encoder consists of two layers: </a:t>
+              <a:t>At a high-level, encoders all have the same basic architecture – a </a:t>
             </a:r>
             <a:r>
               <a:rPr lang="en-US" b="1" i="0" dirty="0">
@@ -3550,7 +3568,7 @@
                 <a:effectLst/>
                 <a:latin typeface="charter"/>
               </a:rPr>
-              <a:t>Self-attention</a:t>
+              <a:t>self-attention</a:t>
             </a:r>
             <a:r>
               <a:rPr lang="en-US" b="0" i="0" dirty="0">
@@ -3560,7 +3578,7 @@
                 <a:effectLst/>
                 <a:latin typeface="charter"/>
               </a:rPr>
-              <a:t> and a feed Forward Neural Network. The encoder’s inputs first flow through a</a:t>
+              <a:t> layer followed by feed Forward Neural Network.  Inputs first flow through a</a:t>
             </a:r>
             <a:r>
               <a:rPr lang="en-US" b="1" i="0" dirty="0">
@@ -3580,7 +3598,7 @@
                 <a:effectLst/>
                 <a:latin typeface="charter"/>
               </a:rPr>
-              <a:t> layer which helps it look at other words in the input sentence as it encodes a specific word.</a:t>
+              <a:t> layer which allows a transformer to consider other words in an input sentence as it encodes a specific word.</a:t>
             </a:r>
             <a:endParaRPr lang="en-US" dirty="0"/>
           </a:p>

</xml_diff>